<commit_message>
added a 6th project
</commit_message>
<xml_diff>
--- a/Lab Slides/01-Intro.pptx
+++ b/Lab Slides/01-Intro.pptx
@@ -8,30 +8,33 @@
     <p:sldMasterId id="2147483687" r:id="rId4"/>
   </p:sldMasterIdLst>
   <p:sldIdLst>
-    <p:sldId id="256" r:id="rId5"/>
-    <p:sldId id="257" r:id="rId6"/>
-    <p:sldId id="258" r:id="rId7"/>
-    <p:sldId id="259" r:id="rId8"/>
-    <p:sldId id="260" r:id="rId9"/>
-    <p:sldId id="261" r:id="rId10"/>
-    <p:sldId id="262" r:id="rId11"/>
-    <p:sldId id="263" r:id="rId12"/>
-    <p:sldId id="264" r:id="rId13"/>
-    <p:sldId id="265" r:id="rId14"/>
-    <p:sldId id="266" r:id="rId15"/>
-    <p:sldId id="278" r:id="rId16"/>
-    <p:sldId id="279" r:id="rId17"/>
-    <p:sldId id="267" r:id="rId18"/>
-    <p:sldId id="268" r:id="rId19"/>
-    <p:sldId id="269" r:id="rId20"/>
-    <p:sldId id="270" r:id="rId21"/>
-    <p:sldId id="271" r:id="rId22"/>
-    <p:sldId id="272" r:id="rId23"/>
-    <p:sldId id="273" r:id="rId24"/>
-    <p:sldId id="274" r:id="rId25"/>
-    <p:sldId id="275" r:id="rId26"/>
-    <p:sldId id="276" r:id="rId27"/>
-    <p:sldId id="277" r:id="rId28"/>
+    <p:sldId id="280" r:id="rId5"/>
+    <p:sldId id="256" r:id="rId6"/>
+    <p:sldId id="282" r:id="rId7"/>
+    <p:sldId id="257" r:id="rId8"/>
+    <p:sldId id="258" r:id="rId9"/>
+    <p:sldId id="259" r:id="rId10"/>
+    <p:sldId id="260" r:id="rId11"/>
+    <p:sldId id="261" r:id="rId12"/>
+    <p:sldId id="262" r:id="rId13"/>
+    <p:sldId id="263" r:id="rId14"/>
+    <p:sldId id="264" r:id="rId15"/>
+    <p:sldId id="265" r:id="rId16"/>
+    <p:sldId id="266" r:id="rId17"/>
+    <p:sldId id="278" r:id="rId18"/>
+    <p:sldId id="279" r:id="rId19"/>
+    <p:sldId id="267" r:id="rId20"/>
+    <p:sldId id="268" r:id="rId21"/>
+    <p:sldId id="269" r:id="rId22"/>
+    <p:sldId id="270" r:id="rId23"/>
+    <p:sldId id="271" r:id="rId24"/>
+    <p:sldId id="272" r:id="rId25"/>
+    <p:sldId id="273" r:id="rId26"/>
+    <p:sldId id="274" r:id="rId27"/>
+    <p:sldId id="275" r:id="rId28"/>
+    <p:sldId id="283" r:id="rId29"/>
+    <p:sldId id="276" r:id="rId30"/>
+    <p:sldId id="277" r:id="rId31"/>
   </p:sldIdLst>
   <p:sldSz cx="9144000" cy="5148263"/>
   <p:notesSz cx="7559675" cy="10691813"/>
@@ -8649,14 +8652,98 @@
       </p:grpSpPr>
       <p:sp>
         <p:nvSpPr>
-          <p:cNvPr id="173" name="CustomShape 1"/>
+          <p:cNvPr id="2" name="Subtitle 1">
+            <a:extLst>
+              <a:ext uri="{FF2B5EF4-FFF2-40B4-BE49-F238E27FC236}">
+                <a16:creationId xmlns:a16="http://schemas.microsoft.com/office/drawing/2014/main" id="{B3C23189-C1DB-4224-B403-50F621D30EB9}"/>
+              </a:ext>
+            </a:extLst>
+          </p:cNvPr>
+          <p:cNvSpPr>
+            <a:spLocks noGrp="1"/>
+          </p:cNvSpPr>
+          <p:nvPr>
+            <p:ph type="subTitle"/>
+          </p:nvPr>
+        </p:nvSpPr>
+        <p:spPr/>
+        <p:txBody>
+          <a:bodyPr/>
+          <a:lstStyle/>
+          <a:p>
+            <a:r>
+              <a:rPr lang="en-US" dirty="0"/>
+              <a:t>Good morning </a:t>
+            </a:r>
+            <a:r>
+              <a:rPr lang="en-US" dirty="0">
+                <a:sym typeface="Wingdings" panose="05000000000000000000" pitchFamily="2" charset="2"/>
+              </a:rPr>
+              <a:t></a:t>
+            </a:r>
+            <a:endParaRPr lang="en-US" dirty="0"/>
+          </a:p>
+          <a:p>
+            <a:r>
+              <a:rPr lang="en-US" dirty="0"/>
+              <a:t>We will start the lab at </a:t>
+            </a:r>
+            <a:r>
+              <a:rPr lang="en-US" b="1" dirty="0">
+                <a:solidFill>
+                  <a:schemeClr val="accent2"/>
+                </a:solidFill>
+              </a:rPr>
+              <a:t>10:15am</a:t>
+            </a:r>
+            <a:endParaRPr lang="en-DE" b="1" dirty="0">
+              <a:solidFill>
+                <a:schemeClr val="accent2"/>
+              </a:solidFill>
+            </a:endParaRPr>
+          </a:p>
+        </p:txBody>
+      </p:sp>
+    </p:spTree>
+    <p:extLst>
+      <p:ext uri="{BB962C8B-B14F-4D97-AF65-F5344CB8AC3E}">
+        <p14:creationId xmlns:p14="http://schemas.microsoft.com/office/powerpoint/2010/main" val="4294631790"/>
+      </p:ext>
+    </p:extLst>
+  </p:cSld>
+  <p:clrMapOvr>
+    <a:masterClrMapping/>
+  </p:clrMapOvr>
+</p:sld>
+</file>
+
+<file path=ppt/slides/slide10.xml><?xml version="1.0" encoding="utf-8"?>
+<p:sld xmlns:a="http://schemas.openxmlformats.org/drawingml/2006/main" xmlns:r="http://schemas.openxmlformats.org/officeDocument/2006/relationships" xmlns:p="http://schemas.openxmlformats.org/presentationml/2006/main">
+  <p:cSld>
+    <p:spTree>
+      <p:nvGrpSpPr>
+        <p:cNvPr id="1" name=""/>
+        <p:cNvGrpSpPr/>
+        <p:nvPr/>
+      </p:nvGrpSpPr>
+      <p:grpSpPr>
+        <a:xfrm>
+          <a:off x="0" y="0"/>
+          <a:ext cx="0" cy="0"/>
+          <a:chOff x="0" y="0"/>
+          <a:chExt cx="0" cy="0"/>
+        </a:xfrm>
+      </p:grpSpPr>
+      <p:sp>
+        <p:nvSpPr>
+          <p:cNvPr id="186" name="CustomShape 1"/>
           <p:cNvSpPr/>
           <p:nvPr/>
         </p:nvSpPr>
         <p:spPr>
           <a:xfrm>
-            <a:off x="263880" y="2271240"/>
-            <a:ext cx="7736400" cy="605880"/>
+            <a:off x="628560" y="273960"/>
+            <a:ext cx="7886160" cy="575280"/>
           </a:xfrm>
           <a:prstGeom prst="rect">
             <a:avLst/>
@@ -8679,25 +8766,25 @@
           <a:fontRef idx="minor"/>
         </p:style>
         <p:txBody>
-          <a:bodyPr lIns="68400" tIns="68400" rIns="68400" bIns="68400" anchor="b"/>
+          <a:bodyPr lIns="68400" tIns="68400" rIns="68400" bIns="68400" anchor="ctr"/>
           <a:lstStyle/>
           <a:p>
-            <a:pPr algn="r">
+            <a:pPr>
               <a:lnSpc>
                 <a:spcPct val="90000"/>
               </a:lnSpc>
             </a:pPr>
             <a:r>
-              <a:rPr lang="en-US" sz="2400" b="1" strike="noStrike" spc="-1">
+              <a:rPr lang="en-US" sz="3300" b="1" strike="noStrike" spc="-1">
                 <a:solidFill>
-                  <a:srgbClr val="FFFFFF"/>
+                  <a:srgbClr val="000000"/>
                 </a:solidFill>
                 <a:latin typeface="Calibri"/>
                 <a:ea typeface="Calibri"/>
               </a:rPr>
-              <a:t>MA-INF 4314 - Lab Semantic Data Web Technologies</a:t>
+              <a:t>Project assignments</a:t>
             </a:r>
-            <a:endParaRPr lang="en-US" sz="2400" b="0" strike="noStrike" spc="-1">
+            <a:endParaRPr lang="en-US" sz="3300" b="0" strike="noStrike" spc="-1">
               <a:latin typeface="Arial"/>
             </a:endParaRPr>
           </a:p>
@@ -8705,14 +8792,14 @@
       </p:sp>
       <p:sp>
         <p:nvSpPr>
-          <p:cNvPr id="174" name="CustomShape 2"/>
+          <p:cNvPr id="187" name="CustomShape 2"/>
           <p:cNvSpPr/>
           <p:nvPr/>
         </p:nvSpPr>
         <p:spPr>
           <a:xfrm>
-            <a:off x="1143000" y="3445560"/>
-            <a:ext cx="6857280" cy="1038240"/>
+            <a:off x="628560" y="907560"/>
+            <a:ext cx="7886160" cy="3728520"/>
           </a:xfrm>
           <a:prstGeom prst="rect">
             <a:avLst/>
@@ -8738,7 +8825,235 @@
           <a:bodyPr lIns="68400" tIns="68400" rIns="68400" bIns="68400"/>
           <a:lstStyle/>
           <a:p>
-            <a:pPr algn="ctr">
+            <a:pPr marL="457200" indent="-361080">
+              <a:lnSpc>
+                <a:spcPct val="90000"/>
+              </a:lnSpc>
+              <a:spcBef>
+                <a:spcPts val="799"/>
+              </a:spcBef>
+              <a:buClr>
+                <a:srgbClr val="1F3864"/>
+              </a:buClr>
+              <a:buFont typeface="Arial"/>
+              <a:buChar char="•"/>
+            </a:pPr>
+            <a:r>
+              <a:rPr lang="en-US" sz="2100" b="0" strike="noStrike" spc="-1">
+                <a:solidFill>
+                  <a:srgbClr val="000000"/>
+                </a:solidFill>
+                <a:latin typeface="Calibri"/>
+                <a:ea typeface="Calibri"/>
+              </a:rPr>
+              <a:t>We will now start with the topic presentations.</a:t>
+            </a:r>
+            <a:endParaRPr lang="en-US" sz="2100" b="0" strike="noStrike" spc="-1">
+              <a:latin typeface="Arial"/>
+            </a:endParaRPr>
+          </a:p>
+          <a:p>
+            <a:pPr marL="457200" indent="-361080">
+              <a:lnSpc>
+                <a:spcPct val="90000"/>
+              </a:lnSpc>
+              <a:spcBef>
+                <a:spcPts val="799"/>
+              </a:spcBef>
+              <a:buClr>
+                <a:srgbClr val="1F3864"/>
+              </a:buClr>
+              <a:buFont typeface="Arial"/>
+              <a:buChar char="•"/>
+            </a:pPr>
+            <a:r>
+              <a:rPr lang="en-US" sz="2100" b="0" strike="noStrike" spc="-1">
+                <a:solidFill>
+                  <a:srgbClr val="000000"/>
+                </a:solidFill>
+                <a:latin typeface="Calibri"/>
+                <a:ea typeface="Calibri"/>
+              </a:rPr>
+              <a:t>If you are interested in a project, you can put your </a:t>
+            </a:r>
+            <a:r>
+              <a:rPr lang="en-US" sz="2100" b="1" strike="noStrike" spc="-1">
+                <a:solidFill>
+                  <a:srgbClr val="000000"/>
+                </a:solidFill>
+                <a:latin typeface="Calibri"/>
+                <a:ea typeface="Calibri"/>
+              </a:rPr>
+              <a:t>full name</a:t>
+            </a:r>
+            <a:r>
+              <a:rPr lang="en-US" sz="2100" b="0" strike="noStrike" spc="-1">
+                <a:solidFill>
+                  <a:srgbClr val="000000"/>
+                </a:solidFill>
+                <a:latin typeface="Calibri"/>
+                <a:ea typeface="Calibri"/>
+              </a:rPr>
+              <a:t> and </a:t>
+            </a:r>
+            <a:r>
+              <a:rPr lang="en-US" sz="2100" b="1" strike="noStrike" spc="-1">
+                <a:solidFill>
+                  <a:srgbClr val="000000"/>
+                </a:solidFill>
+                <a:latin typeface="Calibri"/>
+                <a:ea typeface="Calibri"/>
+              </a:rPr>
+              <a:t>email address</a:t>
+            </a:r>
+            <a:r>
+              <a:rPr lang="en-US" sz="2100" b="0" strike="noStrike" spc="-1">
+                <a:solidFill>
+                  <a:srgbClr val="000000"/>
+                </a:solidFill>
+                <a:latin typeface="Calibri"/>
+                <a:ea typeface="Calibri"/>
+              </a:rPr>
+              <a:t> into the spreadsheet linked in the next slide.</a:t>
+            </a:r>
+            <a:endParaRPr lang="en-US" sz="2100" b="0" strike="noStrike" spc="-1">
+              <a:latin typeface="Arial"/>
+            </a:endParaRPr>
+          </a:p>
+          <a:p>
+            <a:pPr marL="457200" indent="-361080">
+              <a:lnSpc>
+                <a:spcPct val="90000"/>
+              </a:lnSpc>
+              <a:spcBef>
+                <a:spcPts val="799"/>
+              </a:spcBef>
+              <a:buClr>
+                <a:srgbClr val="1F3864"/>
+              </a:buClr>
+              <a:buFont typeface="Arial"/>
+              <a:buChar char="•"/>
+            </a:pPr>
+            <a:r>
+              <a:rPr lang="en-US" sz="2100" b="0" strike="noStrike" spc="-1">
+                <a:solidFill>
+                  <a:srgbClr val="000000"/>
+                </a:solidFill>
+                <a:latin typeface="Calibri"/>
+                <a:ea typeface="Calibri"/>
+              </a:rPr>
+              <a:t>You can register for multiple projects.</a:t>
+            </a:r>
+            <a:endParaRPr lang="en-US" sz="2100" b="0" strike="noStrike" spc="-1">
+              <a:latin typeface="Arial"/>
+            </a:endParaRPr>
+          </a:p>
+          <a:p>
+            <a:pPr marL="457200" indent="-361080">
+              <a:lnSpc>
+                <a:spcPct val="90000"/>
+              </a:lnSpc>
+              <a:spcBef>
+                <a:spcPts val="799"/>
+              </a:spcBef>
+              <a:buClr>
+                <a:srgbClr val="1F3864"/>
+              </a:buClr>
+              <a:buFont typeface="Arial"/>
+              <a:buChar char="•"/>
+            </a:pPr>
+            <a:r>
+              <a:rPr lang="en-US" sz="2100" b="0" strike="noStrike" spc="-1">
+                <a:solidFill>
+                  <a:srgbClr val="000000"/>
+                </a:solidFill>
+                <a:latin typeface="Calibri"/>
+                <a:ea typeface="Calibri"/>
+              </a:rPr>
+              <a:t>You can put your name with up to 3 other people together in one row, if you already know with whom you want to work together.</a:t>
+            </a:r>
+            <a:endParaRPr lang="en-US" sz="2100" b="0" strike="noStrike" spc="-1">
+              <a:latin typeface="Arial"/>
+            </a:endParaRPr>
+          </a:p>
+          <a:p>
+            <a:pPr marL="457200" indent="-361080">
+              <a:lnSpc>
+                <a:spcPct val="90000"/>
+              </a:lnSpc>
+              <a:spcBef>
+                <a:spcPts val="799"/>
+              </a:spcBef>
+              <a:buClr>
+                <a:srgbClr val="1F3864"/>
+              </a:buClr>
+              <a:buFont typeface="Arial"/>
+              <a:buChar char="•"/>
+            </a:pPr>
+            <a:r>
+              <a:rPr lang="en-US" sz="2100" b="0" strike="noStrike" spc="-1">
+                <a:solidFill>
+                  <a:srgbClr val="000000"/>
+                </a:solidFill>
+                <a:latin typeface="Calibri"/>
+                <a:ea typeface="Calibri"/>
+              </a:rPr>
+              <a:t>The project leaders will contact you within the next 7 days.</a:t>
+            </a:r>
+            <a:endParaRPr lang="en-US" sz="2100" b="0" strike="noStrike" spc="-1">
+              <a:latin typeface="Arial"/>
+            </a:endParaRPr>
+          </a:p>
+          <a:p>
+            <a:pPr marL="457200" indent="-361080">
+              <a:lnSpc>
+                <a:spcPct val="90000"/>
+              </a:lnSpc>
+              <a:spcBef>
+                <a:spcPts val="799"/>
+              </a:spcBef>
+              <a:buClr>
+                <a:srgbClr val="1F3864"/>
+              </a:buClr>
+              <a:buFont typeface="Arial"/>
+              <a:buChar char="•"/>
+            </a:pPr>
+            <a:r>
+              <a:rPr lang="en-US" sz="2100" b="0" strike="noStrike" spc="-1">
+                <a:solidFill>
+                  <a:srgbClr val="000000"/>
+                </a:solidFill>
+                <a:latin typeface="Calibri"/>
+                <a:ea typeface="Calibri"/>
+              </a:rPr>
+              <a:t>If you get chosen for a project and confirmed your participation, please </a:t>
+            </a:r>
+            <a:r>
+              <a:rPr lang="en-US" sz="2100" b="1" strike="noStrike" spc="-1">
+                <a:solidFill>
+                  <a:srgbClr val="000000"/>
+                </a:solidFill>
+                <a:latin typeface="Calibri"/>
+                <a:ea typeface="Calibri"/>
+              </a:rPr>
+              <a:t>cross out</a:t>
+            </a:r>
+            <a:r>
+              <a:rPr lang="en-US" sz="2100" b="0" strike="noStrike" spc="-1">
+                <a:solidFill>
+                  <a:srgbClr val="000000"/>
+                </a:solidFill>
+                <a:latin typeface="Calibri"/>
+                <a:ea typeface="Calibri"/>
+              </a:rPr>
+              <a:t> your name in the spreadsheet.</a:t>
+            </a:r>
+            <a:endParaRPr lang="en-US" sz="2100" b="0" strike="noStrike" spc="-1">
+              <a:latin typeface="Arial"/>
+            </a:endParaRPr>
+          </a:p>
+          <a:p>
+            <a:pPr>
               <a:lnSpc>
                 <a:spcPct val="90000"/>
               </a:lnSpc>
@@ -8746,148 +9061,7 @@
                 <a:spcPts val="799"/>
               </a:spcBef>
             </a:pPr>
-            <a:r>
-              <a:rPr lang="en-US" sz="1800" b="0" strike="noStrike" spc="-1">
-                <a:solidFill>
-                  <a:srgbClr val="000000"/>
-                </a:solidFill>
-                <a:latin typeface="Calibri"/>
-                <a:ea typeface="Calibri"/>
-              </a:rPr>
-              <a:t>Dr. Tobias Grubenmann, Firas Kassawat</a:t>
-            </a:r>
-            <a:endParaRPr lang="en-US" sz="1800" b="0" strike="noStrike" spc="-1">
-              <a:latin typeface="Arial"/>
-            </a:endParaRPr>
-          </a:p>
-          <a:p>
-            <a:pPr algn="ctr">
-              <a:lnSpc>
-                <a:spcPct val="90000"/>
-              </a:lnSpc>
-              <a:spcBef>
-                <a:spcPts val="799"/>
-              </a:spcBef>
-            </a:pPr>
-            <a:r>
-              <a:rPr lang="en-US" sz="1800" b="0" strike="noStrike" spc="-1">
-                <a:solidFill>
-                  <a:srgbClr val="000000"/>
-                </a:solidFill>
-                <a:latin typeface="Calibri"/>
-                <a:ea typeface="Calibri"/>
-              </a:rPr>
-              <a:t>30.10.2020</a:t>
-            </a:r>
-            <a:endParaRPr lang="en-US" sz="1800" b="0" strike="noStrike" spc="-1">
-              <a:latin typeface="Arial"/>
-            </a:endParaRPr>
-          </a:p>
-        </p:txBody>
-      </p:sp>
-    </p:spTree>
-  </p:cSld>
-  <p:clrMapOvr>
-    <a:masterClrMapping/>
-  </p:clrMapOvr>
-  <p:timing>
-    <p:tnLst>
-      <p:par>
-        <p:cTn id="1" dur="indefinite" restart="never" nodeType="tmRoot">
-          <p:childTnLst>
-            <p:seq>
-              <p:cTn id="2" dur="indefinite" nodeType="mainSeq"/>
-              <p:prevCondLst>
-                <p:cond evt="onPrev" delay="0">
-                  <p:tgtEl>
-                    <p:sldTgt/>
-                  </p:tgtEl>
-                </p:cond>
-              </p:prevCondLst>
-              <p:nextCondLst>
-                <p:cond evt="onNext" delay="0">
-                  <p:tgtEl>
-                    <p:sldTgt/>
-                  </p:tgtEl>
-                </p:cond>
-              </p:nextCondLst>
-            </p:seq>
-          </p:childTnLst>
-        </p:cTn>
-      </p:par>
-    </p:tnLst>
-  </p:timing>
-</p:sld>
-</file>
-
-<file path=ppt/slides/slide10.xml><?xml version="1.0" encoding="utf-8"?>
-<p:sld xmlns:a="http://schemas.openxmlformats.org/drawingml/2006/main" xmlns:r="http://schemas.openxmlformats.org/officeDocument/2006/relationships" xmlns:p="http://schemas.openxmlformats.org/presentationml/2006/main">
-  <p:cSld>
-    <p:spTree>
-      <p:nvGrpSpPr>
-        <p:cNvPr id="1" name=""/>
-        <p:cNvGrpSpPr/>
-        <p:nvPr/>
-      </p:nvGrpSpPr>
-      <p:grpSpPr>
-        <a:xfrm>
-          <a:off x="0" y="0"/>
-          <a:ext cx="0" cy="0"/>
-          <a:chOff x="0" y="0"/>
-          <a:chExt cx="0" cy="0"/>
-        </a:xfrm>
-      </p:grpSpPr>
-      <p:sp>
-        <p:nvSpPr>
-          <p:cNvPr id="191" name="CustomShape 1"/>
-          <p:cNvSpPr/>
-          <p:nvPr/>
-        </p:nvSpPr>
-        <p:spPr>
-          <a:xfrm>
-            <a:off x="422280" y="2271240"/>
-            <a:ext cx="7578360" cy="605520"/>
-          </a:xfrm>
-          <a:prstGeom prst="rect">
-            <a:avLst/>
-          </a:prstGeom>
-          <a:noFill/>
-          <a:ln>
-            <a:noFill/>
-          </a:ln>
-        </p:spPr>
-        <p:style>
-          <a:lnRef idx="0">
-            <a:scrgbClr r="0" g="0" b="0"/>
-          </a:lnRef>
-          <a:fillRef idx="0">
-            <a:scrgbClr r="0" g="0" b="0"/>
-          </a:fillRef>
-          <a:effectRef idx="0">
-            <a:scrgbClr r="0" g="0" b="0"/>
-          </a:effectRef>
-          <a:fontRef idx="minor"/>
-        </p:style>
-        <p:txBody>
-          <a:bodyPr lIns="68400" tIns="68400" rIns="68400" bIns="68400" anchor="b"/>
-          <a:lstStyle/>
-          <a:p>
-            <a:pPr algn="r">
-              <a:lnSpc>
-                <a:spcPct val="90000"/>
-              </a:lnSpc>
-            </a:pPr>
-            <a:r>
-              <a:rPr lang="en-US" sz="4500" b="1" strike="noStrike" spc="-1">
-                <a:solidFill>
-                  <a:srgbClr val="FFFFFF"/>
-                </a:solidFill>
-                <a:latin typeface="Calibri"/>
-                <a:ea typeface="Calibri"/>
-              </a:rPr>
-              <a:t>Project Presentations</a:t>
-            </a:r>
-            <a:endParaRPr lang="en-US" sz="4500" b="0" strike="noStrike" spc="-1">
+            <a:endParaRPr lang="en-US" sz="2100" b="0" strike="noStrike" spc="-1">
               <a:latin typeface="Arial"/>
             </a:endParaRPr>
           </a:p>
@@ -8947,14 +9121,14 @@
       </p:grpSpPr>
       <p:sp>
         <p:nvSpPr>
-          <p:cNvPr id="192" name="CustomShape 1"/>
+          <p:cNvPr id="188" name="CustomShape 1"/>
           <p:cNvSpPr/>
           <p:nvPr/>
         </p:nvSpPr>
         <p:spPr>
           <a:xfrm>
-            <a:off x="182880" y="156240"/>
-            <a:ext cx="7886160" cy="575280"/>
+            <a:off x="628560" y="273960"/>
+            <a:ext cx="7886160" cy="575640"/>
           </a:xfrm>
           <a:prstGeom prst="rect">
             <a:avLst/>
@@ -8977,24 +9151,25 @@
           <a:fontRef idx="minor"/>
         </p:style>
         <p:txBody>
-          <a:bodyPr lIns="0" tIns="0" rIns="0" bIns="0" anchor="ctr"/>
+          <a:bodyPr lIns="68400" tIns="68400" rIns="68400" bIns="68400" anchor="ctr"/>
           <a:lstStyle/>
           <a:p>
             <a:pPr>
               <a:lnSpc>
-                <a:spcPct val="100000"/>
+                <a:spcPct val="90000"/>
               </a:lnSpc>
             </a:pPr>
             <a:r>
-              <a:rPr lang="en-US" sz="1400" b="0" strike="noStrike" spc="-1">
+              <a:rPr lang="en-US" sz="3300" b="1" strike="noStrike" spc="-1">
                 <a:solidFill>
                   <a:srgbClr val="000000"/>
                 </a:solidFill>
-                <a:latin typeface="Arial"/>
+                <a:latin typeface="Calibri"/>
+                <a:ea typeface="Calibri"/>
               </a:rPr>
-              <a:t>Type of Projects</a:t>
+              <a:t>Spreadsheet for Project Assignment</a:t>
             </a:r>
-            <a:endParaRPr lang="en-US" sz="1400" b="0" strike="noStrike" spc="-1">
+            <a:endParaRPr lang="en-US" sz="3300" b="0" strike="noStrike" spc="-1">
               <a:latin typeface="Arial"/>
             </a:endParaRPr>
           </a:p>
@@ -9002,14 +9177,14 @@
       </p:sp>
       <p:sp>
         <p:nvSpPr>
-          <p:cNvPr id="193" name="CustomShape 2"/>
+          <p:cNvPr id="189" name="CustomShape 2"/>
           <p:cNvSpPr/>
           <p:nvPr/>
         </p:nvSpPr>
         <p:spPr>
           <a:xfrm>
-            <a:off x="266399" y="663840"/>
-            <a:ext cx="8227519" cy="3728520"/>
+            <a:off x="628560" y="907560"/>
+            <a:ext cx="7886160" cy="3728520"/>
           </a:xfrm>
           <a:prstGeom prst="rect">
             <a:avLst/>
@@ -9032,203 +9207,238 @@
           <a:fontRef idx="minor"/>
         </p:style>
         <p:txBody>
-          <a:bodyPr lIns="0" tIns="0" rIns="0" bIns="0">
-            <a:normAutofit/>
-          </a:bodyPr>
+          <a:bodyPr lIns="68400" tIns="68400" rIns="68400" bIns="68400"/>
           <a:lstStyle/>
           <a:p>
-            <a:pPr marL="432000" indent="-323640">
+            <a:pPr marL="457200" indent="-361080">
+              <a:lnSpc>
+                <a:spcPct val="90000"/>
+              </a:lnSpc>
+              <a:spcBef>
+                <a:spcPts val="799"/>
+              </a:spcBef>
+              <a:buClr>
+                <a:srgbClr val="1F3864"/>
+              </a:buClr>
+              <a:buFont typeface="Arial"/>
+              <a:buChar char="•"/>
+            </a:pPr>
+            <a:r>
+              <a:rPr lang="en-US" sz="2100" b="0" strike="noStrike" spc="-1">
+                <a:solidFill>
+                  <a:srgbClr val="000000"/>
+                </a:solidFill>
+                <a:latin typeface="Calibri"/>
+                <a:ea typeface="Calibri"/>
+              </a:rPr>
+              <a:t>Please use the following spreadsheet to declare your interest in a project.</a:t>
+            </a:r>
+            <a:endParaRPr lang="en-US" sz="2100" b="0" strike="noStrike" spc="-1">
+              <a:latin typeface="Arial"/>
+            </a:endParaRPr>
+          </a:p>
+          <a:p>
+            <a:pPr marL="457200" indent="-361080">
+              <a:lnSpc>
+                <a:spcPct val="90000"/>
+              </a:lnSpc>
+              <a:spcBef>
+                <a:spcPts val="799"/>
+              </a:spcBef>
+              <a:buClr>
+                <a:srgbClr val="1F3864"/>
+              </a:buClr>
+              <a:buFont typeface="Arial"/>
+              <a:buChar char="•"/>
+            </a:pPr>
+            <a:r>
+              <a:rPr lang="en-US" sz="2100" b="0" strike="noStrike" spc="-1">
+                <a:solidFill>
+                  <a:srgbClr val="000000"/>
+                </a:solidFill>
+                <a:latin typeface="Calibri"/>
+                <a:ea typeface="Calibri"/>
+              </a:rPr>
+              <a:t>Please check now that you are able to access the spreadsheet.</a:t>
+            </a:r>
+            <a:endParaRPr lang="en-US" sz="2100" b="0" strike="noStrike" spc="-1">
+              <a:latin typeface="Arial"/>
+            </a:endParaRPr>
+          </a:p>
+          <a:p>
+            <a:pPr marL="457200" indent="-361080">
+              <a:lnSpc>
+                <a:spcPct val="90000"/>
+              </a:lnSpc>
+              <a:spcBef>
+                <a:spcPts val="799"/>
+              </a:spcBef>
+              <a:buClr>
+                <a:srgbClr val="1F3864"/>
+              </a:buClr>
+              <a:buFont typeface="Arial"/>
+              <a:buChar char="•"/>
+            </a:pPr>
+            <a:r>
+              <a:rPr lang="en-US" sz="2100" b="0" strike="noStrike" spc="-1">
+                <a:solidFill>
+                  <a:srgbClr val="000000"/>
+                </a:solidFill>
+                <a:latin typeface="Calibri"/>
+                <a:ea typeface="Calibri"/>
+              </a:rPr>
+              <a:t>The spreadsheet will be available until November 1, 11:59pm.</a:t>
+            </a:r>
+            <a:endParaRPr lang="en-US" sz="2100" b="0" strike="noStrike" spc="-1">
+              <a:latin typeface="Arial"/>
+            </a:endParaRPr>
+          </a:p>
+          <a:p>
+            <a:pPr marL="457200" indent="-361080">
+              <a:lnSpc>
+                <a:spcPct val="90000"/>
+              </a:lnSpc>
+              <a:spcBef>
+                <a:spcPts val="799"/>
+              </a:spcBef>
+              <a:buClr>
+                <a:srgbClr val="1F3864"/>
+              </a:buClr>
+              <a:buFont typeface="Arial"/>
+              <a:buChar char="•"/>
+            </a:pPr>
+            <a:r>
+              <a:rPr lang="en-US" sz="2100" b="0" strike="noStrike" spc="-1">
+                <a:solidFill>
+                  <a:srgbClr val="000000"/>
+                </a:solidFill>
+                <a:latin typeface="Calibri"/>
+                <a:ea typeface="Calibri"/>
+              </a:rPr>
+              <a:t>You won’t be able to enter your name after the deadline.</a:t>
+            </a:r>
+            <a:endParaRPr lang="en-US" sz="2100" b="0" strike="noStrike" spc="-1">
+              <a:latin typeface="Arial"/>
+            </a:endParaRPr>
+          </a:p>
+        </p:txBody>
+      </p:sp>
+      <p:sp>
+        <p:nvSpPr>
+          <p:cNvPr id="190" name="CustomShape 3"/>
+          <p:cNvSpPr/>
+          <p:nvPr/>
+        </p:nvSpPr>
+        <p:spPr>
+          <a:xfrm>
+            <a:off x="963360" y="3630240"/>
+            <a:ext cx="7174440" cy="1004760"/>
+          </a:xfrm>
+          <a:prstGeom prst="rect">
+            <a:avLst/>
+          </a:prstGeom>
+          <a:noFill/>
+          <a:ln w="38160">
+            <a:solidFill>
+              <a:schemeClr val="accent2"/>
+            </a:solidFill>
+            <a:round/>
+          </a:ln>
+        </p:spPr>
+        <p:style>
+          <a:lnRef idx="0">
+            <a:scrgbClr r="0" g="0" b="0"/>
+          </a:lnRef>
+          <a:fillRef idx="0">
+            <a:scrgbClr r="0" g="0" b="0"/>
+          </a:fillRef>
+          <a:effectRef idx="0">
+            <a:scrgbClr r="0" g="0" b="0"/>
+          </a:effectRef>
+          <a:fontRef idx="minor"/>
+        </p:style>
+        <p:txBody>
+          <a:bodyPr wrap="none" lIns="90000" tIns="45000" rIns="90000" bIns="45000"/>
+          <a:lstStyle/>
+          <a:p>
+            <a:pPr>
               <a:lnSpc>
                 <a:spcPct val="100000"/>
               </a:lnSpc>
-              <a:spcBef>
-                <a:spcPts val="1417"/>
-              </a:spcBef>
-              <a:buClr>
-                <a:srgbClr val="000000"/>
-              </a:buClr>
-              <a:buSzPct val="45000"/>
-              <a:buFont typeface="Wingdings" charset="2"/>
-              <a:buChar char=""/>
             </a:pPr>
             <a:r>
-              <a:rPr lang="en-US" sz="1400" b="0" strike="noStrike" spc="-1" dirty="0">
+              <a:rPr lang="en-US" sz="2000" b="0" strike="noStrike" spc="-1" dirty="0">
                 <a:solidFill>
                   <a:srgbClr val="000000"/>
                 </a:solidFill>
                 <a:latin typeface="Arial"/>
+                <a:ea typeface="Arial"/>
               </a:rPr>
-              <a:t>Implementation of an already published paper</a:t>
+              <a:t>Link: </a:t>
             </a:r>
-            <a:endParaRPr lang="en-US" sz="1400" b="0" strike="noStrike" spc="-1" dirty="0">
-              <a:latin typeface="Arial"/>
-            </a:endParaRPr>
-          </a:p>
-          <a:p>
-            <a:pPr marL="864000" lvl="1" indent="-323640">
+            <a:r>
+              <a:rPr lang="en-US" sz="2000" b="0" u="sng" strike="noStrike" spc="-1" dirty="0">
+                <a:solidFill>
+                  <a:srgbClr val="0563C1"/>
+                </a:solidFill>
+                <a:uFillTx/>
+                <a:latin typeface="Arial"/>
+                <a:ea typeface="Arial"/>
+                <a:hlinkClick r:id="rId2"/>
+              </a:rPr>
+              <a:t>https://uni-bonn.sciebo.de/s/IwA1dRbIxhqWezK</a:t>
+            </a:r>
+            <a:endParaRPr lang="en-US" sz="2000" b="0" strike="noStrike" spc="-1" dirty="0">
+              <a:latin typeface="Arial"/>
+            </a:endParaRPr>
+          </a:p>
+          <a:p>
+            <a:pPr>
               <a:lnSpc>
                 <a:spcPct val="100000"/>
               </a:lnSpc>
-              <a:spcBef>
-                <a:spcPts val="1134"/>
-              </a:spcBef>
-              <a:buClr>
-                <a:srgbClr val="000000"/>
-              </a:buClr>
-              <a:buSzPct val="75000"/>
-              <a:buFont typeface="Symbol"/>
-              <a:buChar char=""/>
+            </a:pPr>
+            <a:endParaRPr lang="en-US" sz="2000" b="0" strike="noStrike" spc="-1" dirty="0">
+              <a:latin typeface="Arial"/>
+            </a:endParaRPr>
+          </a:p>
+          <a:p>
+            <a:pPr>
+              <a:lnSpc>
+                <a:spcPct val="100000"/>
+              </a:lnSpc>
             </a:pPr>
             <a:r>
-              <a:rPr lang="en-US" sz="1400" b="0" strike="noStrike" spc="-1" dirty="0">
+              <a:rPr lang="en-US" sz="2000" b="0" strike="noStrike" spc="-1" dirty="0">
                 <a:solidFill>
                   <a:srgbClr val="000000"/>
                 </a:solidFill>
                 <a:latin typeface="Arial"/>
+                <a:ea typeface="Arial"/>
               </a:rPr>
-              <a:t>In this type of labs students should implement an algorithm presented in a paper and present the results.</a:t>
+              <a:t>Password: </a:t>
             </a:r>
-            <a:endParaRPr lang="en-US" sz="1400" b="0" strike="noStrike" spc="-1" dirty="0">
-              <a:latin typeface="Arial"/>
-            </a:endParaRPr>
-          </a:p>
-          <a:p>
-            <a:pPr marL="864000" lvl="1" indent="-323640">
-              <a:lnSpc>
-                <a:spcPct val="100000"/>
-              </a:lnSpc>
-              <a:spcBef>
-                <a:spcPts val="1134"/>
-              </a:spcBef>
-              <a:buClr>
-                <a:srgbClr val="000000"/>
-              </a:buClr>
-              <a:buSzPct val="75000"/>
-              <a:buFont typeface="Symbol"/>
-              <a:buChar char=""/>
-            </a:pPr>
             <a:r>
-              <a:rPr lang="en-US" sz="1400" b="0" strike="noStrike" spc="-1" dirty="0">
+              <a:rPr lang="en-US" sz="2000" b="0" strike="noStrike" spc="-1" dirty="0">
                 <a:solidFill>
-                  <a:srgbClr val="000000"/>
+                  <a:srgbClr val="ED7D31"/>
                 </a:solidFill>
                 <a:latin typeface="Arial"/>
+                <a:ea typeface="Arial"/>
               </a:rPr>
-              <a:t>The results would be evaluated on one or multiple datasets.</a:t>
+              <a:t>&lt;The password is provided in </a:t>
             </a:r>
-            <a:endParaRPr lang="en-US" sz="1400" b="0" strike="noStrike" spc="-1" dirty="0">
-              <a:latin typeface="Arial"/>
-            </a:endParaRPr>
-          </a:p>
-          <a:p>
-            <a:pPr marL="864000" lvl="1" indent="-323640">
-              <a:lnSpc>
-                <a:spcPct val="100000"/>
-              </a:lnSpc>
-              <a:spcBef>
-                <a:spcPts val="1134"/>
-              </a:spcBef>
-              <a:buClr>
-                <a:srgbClr val="000000"/>
-              </a:buClr>
-              <a:buSzPct val="75000"/>
-              <a:buFont typeface="Symbol"/>
-              <a:buChar char=""/>
-            </a:pPr>
             <a:r>
-              <a:rPr lang="en-US" sz="1400" b="0" strike="noStrike" spc="-1" dirty="0">
+              <a:rPr lang="en-US" sz="2000" b="0" strike="noStrike" spc="-1">
                 <a:solidFill>
-                  <a:srgbClr val="000000"/>
+                  <a:srgbClr val="ED7D31"/>
                 </a:solidFill>
                 <a:latin typeface="Arial"/>
+                <a:ea typeface="Arial"/>
               </a:rPr>
-              <a:t>Most likely if lab results were convincing then a master thesis topic is presented as a continuous of the lab project (if wanted)</a:t>
+              <a:t>the lecture&gt;</a:t>
             </a:r>
-            <a:endParaRPr lang="en-US" sz="1400" b="0" strike="noStrike" spc="-1" dirty="0">
-              <a:latin typeface="Arial"/>
-            </a:endParaRPr>
-          </a:p>
-          <a:p>
-            <a:pPr marL="432000" indent="-323640">
-              <a:lnSpc>
-                <a:spcPct val="100000"/>
-              </a:lnSpc>
-              <a:spcBef>
-                <a:spcPts val="1417"/>
-              </a:spcBef>
-              <a:buClr>
-                <a:srgbClr val="000000"/>
-              </a:buClr>
-              <a:buSzPct val="45000"/>
-              <a:buFont typeface="Wingdings" charset="2"/>
-              <a:buChar char=""/>
-            </a:pPr>
-            <a:r>
-              <a:rPr lang="en-US" sz="1400" b="0" strike="noStrike" spc="-1" dirty="0">
-                <a:solidFill>
-                  <a:srgbClr val="000000"/>
-                </a:solidFill>
-                <a:latin typeface="Arial"/>
-              </a:rPr>
-              <a:t>Implementation of a code:</a:t>
-            </a:r>
-            <a:endParaRPr lang="en-US" sz="1400" b="0" strike="noStrike" spc="-1" dirty="0">
-              <a:latin typeface="Arial"/>
-            </a:endParaRPr>
-          </a:p>
-          <a:p>
-            <a:pPr marL="864000" lvl="1" indent="-323640">
-              <a:lnSpc>
-                <a:spcPct val="100000"/>
-              </a:lnSpc>
-              <a:spcBef>
-                <a:spcPts val="1134"/>
-              </a:spcBef>
-              <a:buClr>
-                <a:srgbClr val="000000"/>
-              </a:buClr>
-              <a:buSzPct val="75000"/>
-              <a:buFont typeface="Symbol"/>
-              <a:buChar char=""/>
-            </a:pPr>
-            <a:r>
-              <a:rPr lang="en-US" sz="1400" b="0" strike="noStrike" spc="-1" dirty="0">
-                <a:solidFill>
-                  <a:srgbClr val="000000"/>
-                </a:solidFill>
-                <a:latin typeface="Arial"/>
-              </a:rPr>
-              <a:t>An API or a development layer which might be included in other projects</a:t>
-            </a:r>
-            <a:endParaRPr lang="en-US" sz="1400" b="0" strike="noStrike" spc="-1" dirty="0">
-              <a:latin typeface="Arial"/>
-            </a:endParaRPr>
-          </a:p>
-          <a:p>
-            <a:pPr marL="864000" lvl="1" indent="-323640">
-              <a:lnSpc>
-                <a:spcPct val="100000"/>
-              </a:lnSpc>
-              <a:spcBef>
-                <a:spcPts val="1134"/>
-              </a:spcBef>
-              <a:buClr>
-                <a:srgbClr val="000000"/>
-              </a:buClr>
-              <a:buSzPct val="75000"/>
-              <a:buFont typeface="Symbol"/>
-              <a:buChar char=""/>
-            </a:pPr>
-            <a:r>
-              <a:rPr lang="en-US" sz="1400" b="0" strike="noStrike" spc="-1" dirty="0">
-                <a:solidFill>
-                  <a:srgbClr val="000000"/>
-                </a:solidFill>
-                <a:latin typeface="Arial"/>
-              </a:rPr>
-              <a:t>Which gives you the idea how to integrated software are implemented </a:t>
-            </a:r>
-            <a:endParaRPr lang="en-US" sz="1400" b="0" strike="noStrike" spc="-1" dirty="0">
+            <a:endParaRPr lang="en-US" sz="2000" b="0" strike="noStrike" spc="-1" dirty="0">
               <a:latin typeface="Arial"/>
             </a:endParaRPr>
           </a:p>
@@ -9288,6 +9498,455 @@
       </p:grpSpPr>
       <p:sp>
         <p:nvSpPr>
+          <p:cNvPr id="191" name="CustomShape 1"/>
+          <p:cNvSpPr/>
+          <p:nvPr/>
+        </p:nvSpPr>
+        <p:spPr>
+          <a:xfrm>
+            <a:off x="422280" y="2271240"/>
+            <a:ext cx="7578360" cy="605520"/>
+          </a:xfrm>
+          <a:prstGeom prst="rect">
+            <a:avLst/>
+          </a:prstGeom>
+          <a:noFill/>
+          <a:ln>
+            <a:noFill/>
+          </a:ln>
+        </p:spPr>
+        <p:style>
+          <a:lnRef idx="0">
+            <a:scrgbClr r="0" g="0" b="0"/>
+          </a:lnRef>
+          <a:fillRef idx="0">
+            <a:scrgbClr r="0" g="0" b="0"/>
+          </a:fillRef>
+          <a:effectRef idx="0">
+            <a:scrgbClr r="0" g="0" b="0"/>
+          </a:effectRef>
+          <a:fontRef idx="minor"/>
+        </p:style>
+        <p:txBody>
+          <a:bodyPr lIns="68400" tIns="68400" rIns="68400" bIns="68400" anchor="b"/>
+          <a:lstStyle/>
+          <a:p>
+            <a:pPr algn="r">
+              <a:lnSpc>
+                <a:spcPct val="90000"/>
+              </a:lnSpc>
+            </a:pPr>
+            <a:r>
+              <a:rPr lang="en-US" sz="4500" b="1" strike="noStrike" spc="-1">
+                <a:solidFill>
+                  <a:srgbClr val="FFFFFF"/>
+                </a:solidFill>
+                <a:latin typeface="Calibri"/>
+                <a:ea typeface="Calibri"/>
+              </a:rPr>
+              <a:t>Project Presentations</a:t>
+            </a:r>
+            <a:endParaRPr lang="en-US" sz="4500" b="0" strike="noStrike" spc="-1">
+              <a:latin typeface="Arial"/>
+            </a:endParaRPr>
+          </a:p>
+        </p:txBody>
+      </p:sp>
+    </p:spTree>
+  </p:cSld>
+  <p:clrMapOvr>
+    <a:masterClrMapping/>
+  </p:clrMapOvr>
+  <p:timing>
+    <p:tnLst>
+      <p:par>
+        <p:cTn id="1" dur="indefinite" restart="never" nodeType="tmRoot">
+          <p:childTnLst>
+            <p:seq>
+              <p:cTn id="2" dur="indefinite" nodeType="mainSeq"/>
+              <p:prevCondLst>
+                <p:cond evt="onPrev" delay="0">
+                  <p:tgtEl>
+                    <p:sldTgt/>
+                  </p:tgtEl>
+                </p:cond>
+              </p:prevCondLst>
+              <p:nextCondLst>
+                <p:cond evt="onNext" delay="0">
+                  <p:tgtEl>
+                    <p:sldTgt/>
+                  </p:tgtEl>
+                </p:cond>
+              </p:nextCondLst>
+            </p:seq>
+          </p:childTnLst>
+        </p:cTn>
+      </p:par>
+    </p:tnLst>
+  </p:timing>
+</p:sld>
+</file>
+
+<file path=ppt/slides/slide13.xml><?xml version="1.0" encoding="utf-8"?>
+<p:sld xmlns:a="http://schemas.openxmlformats.org/drawingml/2006/main" xmlns:r="http://schemas.openxmlformats.org/officeDocument/2006/relationships" xmlns:p="http://schemas.openxmlformats.org/presentationml/2006/main">
+  <p:cSld>
+    <p:spTree>
+      <p:nvGrpSpPr>
+        <p:cNvPr id="1" name=""/>
+        <p:cNvGrpSpPr/>
+        <p:nvPr/>
+      </p:nvGrpSpPr>
+      <p:grpSpPr>
+        <a:xfrm>
+          <a:off x="0" y="0"/>
+          <a:ext cx="0" cy="0"/>
+          <a:chOff x="0" y="0"/>
+          <a:chExt cx="0" cy="0"/>
+        </a:xfrm>
+      </p:grpSpPr>
+      <p:sp>
+        <p:nvSpPr>
+          <p:cNvPr id="192" name="CustomShape 1"/>
+          <p:cNvSpPr/>
+          <p:nvPr/>
+        </p:nvSpPr>
+        <p:spPr>
+          <a:xfrm>
+            <a:off x="182880" y="156240"/>
+            <a:ext cx="7886160" cy="575280"/>
+          </a:xfrm>
+          <a:prstGeom prst="rect">
+            <a:avLst/>
+          </a:prstGeom>
+          <a:noFill/>
+          <a:ln>
+            <a:noFill/>
+          </a:ln>
+        </p:spPr>
+        <p:style>
+          <a:lnRef idx="0">
+            <a:scrgbClr r="0" g="0" b="0"/>
+          </a:lnRef>
+          <a:fillRef idx="0">
+            <a:scrgbClr r="0" g="0" b="0"/>
+          </a:fillRef>
+          <a:effectRef idx="0">
+            <a:scrgbClr r="0" g="0" b="0"/>
+          </a:effectRef>
+          <a:fontRef idx="minor"/>
+        </p:style>
+        <p:txBody>
+          <a:bodyPr lIns="0" tIns="0" rIns="0" bIns="0" anchor="ctr"/>
+          <a:lstStyle/>
+          <a:p>
+            <a:pPr>
+              <a:lnSpc>
+                <a:spcPct val="100000"/>
+              </a:lnSpc>
+            </a:pPr>
+            <a:r>
+              <a:rPr lang="en-US" sz="1400" b="0" strike="noStrike" spc="-1">
+                <a:solidFill>
+                  <a:srgbClr val="000000"/>
+                </a:solidFill>
+                <a:latin typeface="Arial"/>
+              </a:rPr>
+              <a:t>Type of Projects</a:t>
+            </a:r>
+            <a:endParaRPr lang="en-US" sz="1400" b="0" strike="noStrike" spc="-1">
+              <a:latin typeface="Arial"/>
+            </a:endParaRPr>
+          </a:p>
+        </p:txBody>
+      </p:sp>
+      <p:sp>
+        <p:nvSpPr>
+          <p:cNvPr id="193" name="CustomShape 2"/>
+          <p:cNvSpPr/>
+          <p:nvPr/>
+        </p:nvSpPr>
+        <p:spPr>
+          <a:xfrm>
+            <a:off x="266399" y="663840"/>
+            <a:ext cx="8227519" cy="3728520"/>
+          </a:xfrm>
+          <a:prstGeom prst="rect">
+            <a:avLst/>
+          </a:prstGeom>
+          <a:noFill/>
+          <a:ln>
+            <a:noFill/>
+          </a:ln>
+        </p:spPr>
+        <p:style>
+          <a:lnRef idx="0">
+            <a:scrgbClr r="0" g="0" b="0"/>
+          </a:lnRef>
+          <a:fillRef idx="0">
+            <a:scrgbClr r="0" g="0" b="0"/>
+          </a:fillRef>
+          <a:effectRef idx="0">
+            <a:scrgbClr r="0" g="0" b="0"/>
+          </a:effectRef>
+          <a:fontRef idx="minor"/>
+        </p:style>
+        <p:txBody>
+          <a:bodyPr lIns="0" tIns="0" rIns="0" bIns="0">
+            <a:normAutofit/>
+          </a:bodyPr>
+          <a:lstStyle/>
+          <a:p>
+            <a:pPr marL="432000" indent="-323640">
+              <a:lnSpc>
+                <a:spcPct val="100000"/>
+              </a:lnSpc>
+              <a:spcBef>
+                <a:spcPts val="1417"/>
+              </a:spcBef>
+              <a:buClr>
+                <a:srgbClr val="000000"/>
+              </a:buClr>
+              <a:buSzPct val="45000"/>
+              <a:buFont typeface="Wingdings" charset="2"/>
+              <a:buChar char=""/>
+            </a:pPr>
+            <a:r>
+              <a:rPr lang="en-US" sz="1400" b="0" strike="noStrike" spc="-1" dirty="0">
+                <a:solidFill>
+                  <a:srgbClr val="000000"/>
+                </a:solidFill>
+                <a:latin typeface="Arial"/>
+              </a:rPr>
+              <a:t>Implementation of an already published paper</a:t>
+            </a:r>
+            <a:endParaRPr lang="en-US" sz="1400" b="0" strike="noStrike" spc="-1" dirty="0">
+              <a:latin typeface="Arial"/>
+            </a:endParaRPr>
+          </a:p>
+          <a:p>
+            <a:pPr marL="864000" lvl="1" indent="-323640">
+              <a:lnSpc>
+                <a:spcPct val="100000"/>
+              </a:lnSpc>
+              <a:spcBef>
+                <a:spcPts val="1134"/>
+              </a:spcBef>
+              <a:buClr>
+                <a:srgbClr val="000000"/>
+              </a:buClr>
+              <a:buSzPct val="75000"/>
+              <a:buFont typeface="Symbol"/>
+              <a:buChar char=""/>
+            </a:pPr>
+            <a:r>
+              <a:rPr lang="en-US" sz="1400" b="0" strike="noStrike" spc="-1" dirty="0">
+                <a:solidFill>
+                  <a:srgbClr val="000000"/>
+                </a:solidFill>
+                <a:latin typeface="Arial"/>
+              </a:rPr>
+              <a:t>In this type of labs students should implement an algorithm presented in a paper and present the results.</a:t>
+            </a:r>
+            <a:endParaRPr lang="en-US" sz="1400" b="0" strike="noStrike" spc="-1" dirty="0">
+              <a:latin typeface="Arial"/>
+            </a:endParaRPr>
+          </a:p>
+          <a:p>
+            <a:pPr marL="864000" lvl="1" indent="-323640">
+              <a:lnSpc>
+                <a:spcPct val="100000"/>
+              </a:lnSpc>
+              <a:spcBef>
+                <a:spcPts val="1134"/>
+              </a:spcBef>
+              <a:buClr>
+                <a:srgbClr val="000000"/>
+              </a:buClr>
+              <a:buSzPct val="75000"/>
+              <a:buFont typeface="Symbol"/>
+              <a:buChar char=""/>
+            </a:pPr>
+            <a:r>
+              <a:rPr lang="en-US" sz="1400" b="0" strike="noStrike" spc="-1" dirty="0">
+                <a:solidFill>
+                  <a:srgbClr val="000000"/>
+                </a:solidFill>
+                <a:latin typeface="Arial"/>
+              </a:rPr>
+              <a:t>The results would be evaluated on one or multiple datasets.</a:t>
+            </a:r>
+            <a:endParaRPr lang="en-US" sz="1400" b="0" strike="noStrike" spc="-1" dirty="0">
+              <a:latin typeface="Arial"/>
+            </a:endParaRPr>
+          </a:p>
+          <a:p>
+            <a:pPr marL="864000" lvl="1" indent="-323640">
+              <a:lnSpc>
+                <a:spcPct val="100000"/>
+              </a:lnSpc>
+              <a:spcBef>
+                <a:spcPts val="1134"/>
+              </a:spcBef>
+              <a:buClr>
+                <a:srgbClr val="000000"/>
+              </a:buClr>
+              <a:buSzPct val="75000"/>
+              <a:buFont typeface="Symbol"/>
+              <a:buChar char=""/>
+            </a:pPr>
+            <a:r>
+              <a:rPr lang="en-US" sz="1400" b="0" strike="noStrike" spc="-1" dirty="0">
+                <a:solidFill>
+                  <a:srgbClr val="000000"/>
+                </a:solidFill>
+                <a:latin typeface="Arial"/>
+              </a:rPr>
+              <a:t>Most likely if lab results were convincing then a master thesis topic is presented as a continuous of the lab project (if wanted)</a:t>
+            </a:r>
+            <a:endParaRPr lang="en-US" sz="1400" b="0" strike="noStrike" spc="-1" dirty="0">
+              <a:latin typeface="Arial"/>
+            </a:endParaRPr>
+          </a:p>
+          <a:p>
+            <a:pPr marL="432000" indent="-323640">
+              <a:lnSpc>
+                <a:spcPct val="100000"/>
+              </a:lnSpc>
+              <a:spcBef>
+                <a:spcPts val="1417"/>
+              </a:spcBef>
+              <a:buClr>
+                <a:srgbClr val="000000"/>
+              </a:buClr>
+              <a:buSzPct val="45000"/>
+              <a:buFont typeface="Wingdings" charset="2"/>
+              <a:buChar char=""/>
+            </a:pPr>
+            <a:r>
+              <a:rPr lang="en-US" sz="1400" b="0" strike="noStrike" spc="-1" dirty="0">
+                <a:solidFill>
+                  <a:srgbClr val="000000"/>
+                </a:solidFill>
+                <a:latin typeface="Arial"/>
+              </a:rPr>
+              <a:t>Implementation of a code:</a:t>
+            </a:r>
+            <a:endParaRPr lang="en-US" sz="1400" b="0" strike="noStrike" spc="-1" dirty="0">
+              <a:latin typeface="Arial"/>
+            </a:endParaRPr>
+          </a:p>
+          <a:p>
+            <a:pPr marL="864000" lvl="1" indent="-323640">
+              <a:lnSpc>
+                <a:spcPct val="100000"/>
+              </a:lnSpc>
+              <a:spcBef>
+                <a:spcPts val="1134"/>
+              </a:spcBef>
+              <a:buClr>
+                <a:srgbClr val="000000"/>
+              </a:buClr>
+              <a:buSzPct val="75000"/>
+              <a:buFont typeface="Symbol"/>
+              <a:buChar char=""/>
+            </a:pPr>
+            <a:r>
+              <a:rPr lang="en-US" sz="1400" b="0" strike="noStrike" spc="-1" dirty="0">
+                <a:solidFill>
+                  <a:srgbClr val="000000"/>
+                </a:solidFill>
+                <a:latin typeface="Arial"/>
+              </a:rPr>
+              <a:t>An API or a development layer which might be included in other projects</a:t>
+            </a:r>
+            <a:endParaRPr lang="en-US" sz="1400" b="0" strike="noStrike" spc="-1" dirty="0">
+              <a:latin typeface="Arial"/>
+            </a:endParaRPr>
+          </a:p>
+          <a:p>
+            <a:pPr marL="864000" lvl="1" indent="-323640">
+              <a:lnSpc>
+                <a:spcPct val="100000"/>
+              </a:lnSpc>
+              <a:spcBef>
+                <a:spcPts val="1134"/>
+              </a:spcBef>
+              <a:buClr>
+                <a:srgbClr val="000000"/>
+              </a:buClr>
+              <a:buSzPct val="75000"/>
+              <a:buFont typeface="Symbol"/>
+              <a:buChar char=""/>
+            </a:pPr>
+            <a:r>
+              <a:rPr lang="en-US" sz="1400" b="0" strike="noStrike" spc="-1" dirty="0">
+                <a:solidFill>
+                  <a:srgbClr val="000000"/>
+                </a:solidFill>
+                <a:latin typeface="Arial"/>
+              </a:rPr>
+              <a:t>Which gives you the idea how to integrated software are implemented </a:t>
+            </a:r>
+            <a:endParaRPr lang="en-US" sz="1400" b="0" strike="noStrike" spc="-1" dirty="0">
+              <a:latin typeface="Arial"/>
+            </a:endParaRPr>
+          </a:p>
+        </p:txBody>
+      </p:sp>
+    </p:spTree>
+  </p:cSld>
+  <p:clrMapOvr>
+    <a:masterClrMapping/>
+  </p:clrMapOvr>
+  <p:timing>
+    <p:tnLst>
+      <p:par>
+        <p:cTn id="1" dur="indefinite" restart="never" nodeType="tmRoot">
+          <p:childTnLst>
+            <p:seq>
+              <p:cTn id="2" dur="indefinite" nodeType="mainSeq"/>
+              <p:prevCondLst>
+                <p:cond evt="onPrev" delay="0">
+                  <p:tgtEl>
+                    <p:sldTgt/>
+                  </p:tgtEl>
+                </p:cond>
+              </p:prevCondLst>
+              <p:nextCondLst>
+                <p:cond evt="onNext" delay="0">
+                  <p:tgtEl>
+                    <p:sldTgt/>
+                  </p:tgtEl>
+                </p:cond>
+              </p:nextCondLst>
+            </p:seq>
+          </p:childTnLst>
+        </p:cTn>
+      </p:par>
+    </p:tnLst>
+  </p:timing>
+</p:sld>
+</file>
+
+<file path=ppt/slides/slide14.xml><?xml version="1.0" encoding="utf-8"?>
+<p:sld xmlns:a="http://schemas.openxmlformats.org/drawingml/2006/main" xmlns:r="http://schemas.openxmlformats.org/officeDocument/2006/relationships" xmlns:p="http://schemas.openxmlformats.org/presentationml/2006/main">
+  <p:cSld>
+    <p:spTree>
+      <p:nvGrpSpPr>
+        <p:cNvPr id="1" name=""/>
+        <p:cNvGrpSpPr/>
+        <p:nvPr/>
+      </p:nvGrpSpPr>
+      <p:grpSpPr>
+        <a:xfrm>
+          <a:off x="0" y="0"/>
+          <a:ext cx="0" cy="0"/>
+          <a:chOff x="0" y="0"/>
+          <a:chExt cx="0" cy="0"/>
+        </a:xfrm>
+      </p:grpSpPr>
+      <p:sp>
+        <p:nvSpPr>
           <p:cNvPr id="194" name="TextShape 1"/>
           <p:cNvSpPr txBox="1"/>
           <p:nvPr/>
@@ -9381,7 +10040,7 @@
 </p:sld>
 </file>
 
-<file path=ppt/slides/slide13.xml><?xml version="1.0" encoding="utf-8"?>
+<file path=ppt/slides/slide15.xml><?xml version="1.0" encoding="utf-8"?>
 <p:sld xmlns:a="http://schemas.openxmlformats.org/drawingml/2006/main" xmlns:r="http://schemas.openxmlformats.org/officeDocument/2006/relationships" xmlns:p="http://schemas.openxmlformats.org/presentationml/2006/main">
   <p:cSld>
     <p:spTree>
@@ -10528,7 +11187,7 @@
 </p:sld>
 </file>
 
-<file path=ppt/slides/slide14.xml><?xml version="1.0" encoding="utf-8"?>
+<file path=ppt/slides/slide16.xml><?xml version="1.0" encoding="utf-8"?>
 <p:sld xmlns:a="http://schemas.openxmlformats.org/drawingml/2006/main" xmlns:r="http://schemas.openxmlformats.org/officeDocument/2006/relationships" xmlns:p="http://schemas.openxmlformats.org/presentationml/2006/main">
   <p:cSld>
     <p:bg>
@@ -10903,7 +11562,7 @@
 </p:sld>
 </file>
 
-<file path=ppt/slides/slide15.xml><?xml version="1.0" encoding="utf-8"?>
+<file path=ppt/slides/slide17.xml><?xml version="1.0" encoding="utf-8"?>
 <p:sld xmlns:a="http://schemas.openxmlformats.org/drawingml/2006/main" xmlns:r="http://schemas.openxmlformats.org/officeDocument/2006/relationships" xmlns:p="http://schemas.openxmlformats.org/presentationml/2006/main">
   <p:cSld>
     <p:spTree>
@@ -12014,7 +12673,7 @@
 </p:sld>
 </file>
 
-<file path=ppt/slides/slide16.xml><?xml version="1.0" encoding="utf-8"?>
+<file path=ppt/slides/slide18.xml><?xml version="1.0" encoding="utf-8"?>
 <p:sld xmlns:a="http://schemas.openxmlformats.org/drawingml/2006/main" xmlns:r="http://schemas.openxmlformats.org/officeDocument/2006/relationships" xmlns:p="http://schemas.openxmlformats.org/presentationml/2006/main">
   <p:cSld>
     <p:spTree>
@@ -12339,7 +12998,7 @@
 </p:sld>
 </file>
 
-<file path=ppt/slides/slide17.xml><?xml version="1.0" encoding="utf-8"?>
+<file path=ppt/slides/slide19.xml><?xml version="1.0" encoding="utf-8"?>
 <p:sld xmlns:a="http://schemas.openxmlformats.org/drawingml/2006/main" xmlns:r="http://schemas.openxmlformats.org/officeDocument/2006/relationships" xmlns:p="http://schemas.openxmlformats.org/presentationml/2006/main">
   <p:cSld>
     <p:spTree>
@@ -13374,7 +14033,197 @@
 </p:sld>
 </file>
 
-<file path=ppt/slides/slide18.xml><?xml version="1.0" encoding="utf-8"?>
+<file path=ppt/slides/slide2.xml><?xml version="1.0" encoding="utf-8"?>
+<p:sld xmlns:a="http://schemas.openxmlformats.org/drawingml/2006/main" xmlns:r="http://schemas.openxmlformats.org/officeDocument/2006/relationships" xmlns:p="http://schemas.openxmlformats.org/presentationml/2006/main">
+  <p:cSld>
+    <p:spTree>
+      <p:nvGrpSpPr>
+        <p:cNvPr id="1" name=""/>
+        <p:cNvGrpSpPr/>
+        <p:nvPr/>
+      </p:nvGrpSpPr>
+      <p:grpSpPr>
+        <a:xfrm>
+          <a:off x="0" y="0"/>
+          <a:ext cx="0" cy="0"/>
+          <a:chOff x="0" y="0"/>
+          <a:chExt cx="0" cy="0"/>
+        </a:xfrm>
+      </p:grpSpPr>
+      <p:sp>
+        <p:nvSpPr>
+          <p:cNvPr id="173" name="CustomShape 1"/>
+          <p:cNvSpPr/>
+          <p:nvPr/>
+        </p:nvSpPr>
+        <p:spPr>
+          <a:xfrm>
+            <a:off x="263880" y="2271240"/>
+            <a:ext cx="7736400" cy="605880"/>
+          </a:xfrm>
+          <a:prstGeom prst="rect">
+            <a:avLst/>
+          </a:prstGeom>
+          <a:noFill/>
+          <a:ln>
+            <a:noFill/>
+          </a:ln>
+        </p:spPr>
+        <p:style>
+          <a:lnRef idx="0">
+            <a:scrgbClr r="0" g="0" b="0"/>
+          </a:lnRef>
+          <a:fillRef idx="0">
+            <a:scrgbClr r="0" g="0" b="0"/>
+          </a:fillRef>
+          <a:effectRef idx="0">
+            <a:scrgbClr r="0" g="0" b="0"/>
+          </a:effectRef>
+          <a:fontRef idx="minor"/>
+        </p:style>
+        <p:txBody>
+          <a:bodyPr lIns="68400" tIns="68400" rIns="68400" bIns="68400" anchor="b"/>
+          <a:lstStyle/>
+          <a:p>
+            <a:pPr algn="r">
+              <a:lnSpc>
+                <a:spcPct val="90000"/>
+              </a:lnSpc>
+            </a:pPr>
+            <a:r>
+              <a:rPr lang="en-US" sz="2400" b="1" strike="noStrike" spc="-1">
+                <a:solidFill>
+                  <a:srgbClr val="FFFFFF"/>
+                </a:solidFill>
+                <a:latin typeface="Calibri"/>
+                <a:ea typeface="Calibri"/>
+              </a:rPr>
+              <a:t>MA-INF 4314 - Lab Semantic Data Web Technologies</a:t>
+            </a:r>
+            <a:endParaRPr lang="en-US" sz="2400" b="0" strike="noStrike" spc="-1">
+              <a:latin typeface="Arial"/>
+            </a:endParaRPr>
+          </a:p>
+        </p:txBody>
+      </p:sp>
+      <p:sp>
+        <p:nvSpPr>
+          <p:cNvPr id="174" name="CustomShape 2"/>
+          <p:cNvSpPr/>
+          <p:nvPr/>
+        </p:nvSpPr>
+        <p:spPr>
+          <a:xfrm>
+            <a:off x="1143000" y="3445560"/>
+            <a:ext cx="6857280" cy="1038240"/>
+          </a:xfrm>
+          <a:prstGeom prst="rect">
+            <a:avLst/>
+          </a:prstGeom>
+          <a:noFill/>
+          <a:ln>
+            <a:noFill/>
+          </a:ln>
+        </p:spPr>
+        <p:style>
+          <a:lnRef idx="0">
+            <a:scrgbClr r="0" g="0" b="0"/>
+          </a:lnRef>
+          <a:fillRef idx="0">
+            <a:scrgbClr r="0" g="0" b="0"/>
+          </a:fillRef>
+          <a:effectRef idx="0">
+            <a:scrgbClr r="0" g="0" b="0"/>
+          </a:effectRef>
+          <a:fontRef idx="minor"/>
+        </p:style>
+        <p:txBody>
+          <a:bodyPr lIns="68400" tIns="68400" rIns="68400" bIns="68400"/>
+          <a:lstStyle/>
+          <a:p>
+            <a:pPr algn="ctr">
+              <a:lnSpc>
+                <a:spcPct val="90000"/>
+              </a:lnSpc>
+              <a:spcBef>
+                <a:spcPts val="799"/>
+              </a:spcBef>
+            </a:pPr>
+            <a:r>
+              <a:rPr lang="en-US" sz="1800" b="0" strike="noStrike" spc="-1">
+                <a:solidFill>
+                  <a:srgbClr val="000000"/>
+                </a:solidFill>
+                <a:latin typeface="Calibri"/>
+                <a:ea typeface="Calibri"/>
+              </a:rPr>
+              <a:t>Dr. Tobias Grubenmann, Firas Kassawat</a:t>
+            </a:r>
+            <a:endParaRPr lang="en-US" sz="1800" b="0" strike="noStrike" spc="-1">
+              <a:latin typeface="Arial"/>
+            </a:endParaRPr>
+          </a:p>
+          <a:p>
+            <a:pPr algn="ctr">
+              <a:lnSpc>
+                <a:spcPct val="90000"/>
+              </a:lnSpc>
+              <a:spcBef>
+                <a:spcPts val="799"/>
+              </a:spcBef>
+            </a:pPr>
+            <a:r>
+              <a:rPr lang="en-US" sz="1800" b="0" strike="noStrike" spc="-1">
+                <a:solidFill>
+                  <a:srgbClr val="000000"/>
+                </a:solidFill>
+                <a:latin typeface="Calibri"/>
+                <a:ea typeface="Calibri"/>
+              </a:rPr>
+              <a:t>30.10.2020</a:t>
+            </a:r>
+            <a:endParaRPr lang="en-US" sz="1800" b="0" strike="noStrike" spc="-1">
+              <a:latin typeface="Arial"/>
+            </a:endParaRPr>
+          </a:p>
+        </p:txBody>
+      </p:sp>
+    </p:spTree>
+  </p:cSld>
+  <p:clrMapOvr>
+    <a:masterClrMapping/>
+  </p:clrMapOvr>
+  <p:timing>
+    <p:tnLst>
+      <p:par>
+        <p:cTn id="1" dur="indefinite" restart="never" nodeType="tmRoot">
+          <p:childTnLst>
+            <p:seq>
+              <p:cTn id="2" dur="indefinite" nodeType="mainSeq"/>
+              <p:prevCondLst>
+                <p:cond evt="onPrev" delay="0">
+                  <p:tgtEl>
+                    <p:sldTgt/>
+                  </p:tgtEl>
+                </p:cond>
+              </p:prevCondLst>
+              <p:nextCondLst>
+                <p:cond evt="onNext" delay="0">
+                  <p:tgtEl>
+                    <p:sldTgt/>
+                  </p:tgtEl>
+                </p:cond>
+              </p:nextCondLst>
+            </p:seq>
+          </p:childTnLst>
+        </p:cTn>
+      </p:par>
+    </p:tnLst>
+  </p:timing>
+</p:sld>
+</file>
+
+<file path=ppt/slides/slide20.xml><?xml version="1.0" encoding="utf-8"?>
 <p:sld xmlns:a="http://schemas.openxmlformats.org/drawingml/2006/main" xmlns:r="http://schemas.openxmlformats.org/officeDocument/2006/relationships" xmlns:p="http://schemas.openxmlformats.org/presentationml/2006/main">
   <p:cSld>
     <p:spTree>
@@ -13631,7 +14480,7 @@
 </p:sld>
 </file>
 
-<file path=ppt/slides/slide19.xml><?xml version="1.0" encoding="utf-8"?>
+<file path=ppt/slides/slide21.xml><?xml version="1.0" encoding="utf-8"?>
 <p:sld xmlns:a="http://schemas.openxmlformats.org/drawingml/2006/main" xmlns:r="http://schemas.openxmlformats.org/officeDocument/2006/relationships" xmlns:p="http://schemas.openxmlformats.org/presentationml/2006/main">
   <p:cSld>
     <p:spTree>
@@ -13770,115 +14619,7 @@
 </p:sld>
 </file>
 
-<file path=ppt/slides/slide2.xml><?xml version="1.0" encoding="utf-8"?>
-<p:sld xmlns:a="http://schemas.openxmlformats.org/drawingml/2006/main" xmlns:r="http://schemas.openxmlformats.org/officeDocument/2006/relationships" xmlns:p="http://schemas.openxmlformats.org/presentationml/2006/main">
-  <p:cSld>
-    <p:spTree>
-      <p:nvGrpSpPr>
-        <p:cNvPr id="1" name=""/>
-        <p:cNvGrpSpPr/>
-        <p:nvPr/>
-      </p:nvGrpSpPr>
-      <p:grpSpPr>
-        <a:xfrm>
-          <a:off x="0" y="0"/>
-          <a:ext cx="0" cy="0"/>
-          <a:chOff x="0" y="0"/>
-          <a:chExt cx="0" cy="0"/>
-        </a:xfrm>
-      </p:grpSpPr>
-      <p:sp>
-        <p:nvSpPr>
-          <p:cNvPr id="175" name="CustomShape 1"/>
-          <p:cNvSpPr/>
-          <p:nvPr/>
-        </p:nvSpPr>
-        <p:spPr>
-          <a:xfrm>
-            <a:off x="422280" y="2271240"/>
-            <a:ext cx="7578360" cy="1944000"/>
-          </a:xfrm>
-          <a:prstGeom prst="rect">
-            <a:avLst/>
-          </a:prstGeom>
-          <a:noFill/>
-          <a:ln>
-            <a:noFill/>
-          </a:ln>
-        </p:spPr>
-        <p:style>
-          <a:lnRef idx="0">
-            <a:scrgbClr r="0" g="0" b="0"/>
-          </a:lnRef>
-          <a:fillRef idx="0">
-            <a:scrgbClr r="0" g="0" b="0"/>
-          </a:fillRef>
-          <a:effectRef idx="0">
-            <a:scrgbClr r="0" g="0" b="0"/>
-          </a:effectRef>
-          <a:fontRef idx="minor"/>
-        </p:style>
-        <p:txBody>
-          <a:bodyPr lIns="68400" tIns="68400" rIns="68400" bIns="68400"/>
-          <a:lstStyle/>
-          <a:p>
-            <a:pPr algn="r">
-              <a:lnSpc>
-                <a:spcPct val="90000"/>
-              </a:lnSpc>
-            </a:pPr>
-            <a:r>
-              <a:rPr lang="en-US" sz="4500" b="1" strike="noStrike" spc="-1">
-                <a:solidFill>
-                  <a:srgbClr val="FFFFFF"/>
-                </a:solidFill>
-                <a:latin typeface="Calibri"/>
-                <a:ea typeface="Calibri"/>
-              </a:rPr>
-              <a:t>General Information</a:t>
-            </a:r>
-            <a:endParaRPr lang="en-US" sz="4500" b="0" strike="noStrike" spc="-1">
-              <a:latin typeface="Arial"/>
-            </a:endParaRPr>
-          </a:p>
-        </p:txBody>
-      </p:sp>
-    </p:spTree>
-  </p:cSld>
-  <p:clrMapOvr>
-    <a:masterClrMapping/>
-  </p:clrMapOvr>
-  <p:timing>
-    <p:tnLst>
-      <p:par>
-        <p:cTn id="1" dur="indefinite" restart="never" nodeType="tmRoot">
-          <p:childTnLst>
-            <p:seq>
-              <p:cTn id="2" dur="indefinite" nodeType="mainSeq"/>
-              <p:prevCondLst>
-                <p:cond evt="onPrev" delay="0">
-                  <p:tgtEl>
-                    <p:sldTgt/>
-                  </p:tgtEl>
-                </p:cond>
-              </p:prevCondLst>
-              <p:nextCondLst>
-                <p:cond evt="onNext" delay="0">
-                  <p:tgtEl>
-                    <p:sldTgt/>
-                  </p:tgtEl>
-                </p:cond>
-              </p:nextCondLst>
-            </p:seq>
-          </p:childTnLst>
-        </p:cTn>
-      </p:par>
-    </p:tnLst>
-  </p:timing>
-</p:sld>
-</file>
-
-<file path=ppt/slides/slide20.xml><?xml version="1.0" encoding="utf-8"?>
+<file path=ppt/slides/slide22.xml><?xml version="1.0" encoding="utf-8"?>
 <p:sld xmlns:a="http://schemas.openxmlformats.org/drawingml/2006/main" xmlns:r="http://schemas.openxmlformats.org/officeDocument/2006/relationships" xmlns:p="http://schemas.openxmlformats.org/presentationml/2006/main">
   <p:cSld>
     <p:spTree>
@@ -14952,7 +15693,7 @@
 </p:sld>
 </file>
 
-<file path=ppt/slides/slide21.xml><?xml version="1.0" encoding="utf-8"?>
+<file path=ppt/slides/slide23.xml><?xml version="1.0" encoding="utf-8"?>
 <p:sld xmlns:a="http://schemas.openxmlformats.org/drawingml/2006/main" xmlns:r="http://schemas.openxmlformats.org/officeDocument/2006/relationships" xmlns:p="http://schemas.openxmlformats.org/presentationml/2006/main">
   <p:cSld>
     <p:spTree>
@@ -15135,7 +15876,7 @@
 </p:sld>
 </file>
 
-<file path=ppt/slides/slide22.xml><?xml version="1.0" encoding="utf-8"?>
+<file path=ppt/slides/slide24.xml><?xml version="1.0" encoding="utf-8"?>
 <p:sld xmlns:a="http://schemas.openxmlformats.org/drawingml/2006/main" xmlns:r="http://schemas.openxmlformats.org/officeDocument/2006/relationships" xmlns:p="http://schemas.openxmlformats.org/presentationml/2006/main">
   <p:cSld>
     <p:spTree>
@@ -16150,7 +16891,1015 @@
 </p:sld>
 </file>
 
-<file path=ppt/slides/slide23.xml><?xml version="1.0" encoding="utf-8"?>
+<file path=ppt/slides/slide25.xml><?xml version="1.0" encoding="utf-8"?>
+<p:sld xmlns:a="http://schemas.openxmlformats.org/drawingml/2006/main" xmlns:r="http://schemas.openxmlformats.org/officeDocument/2006/relationships" xmlns:p="http://schemas.openxmlformats.org/presentationml/2006/main">
+  <p:cSld>
+    <p:spTree>
+      <p:nvGrpSpPr>
+        <p:cNvPr id="1" name=""/>
+        <p:cNvGrpSpPr/>
+        <p:nvPr/>
+      </p:nvGrpSpPr>
+      <p:grpSpPr>
+        <a:xfrm>
+          <a:off x="0" y="0"/>
+          <a:ext cx="0" cy="0"/>
+          <a:chOff x="0" y="0"/>
+          <a:chExt cx="0" cy="0"/>
+        </a:xfrm>
+      </p:grpSpPr>
+      <p:graphicFrame>
+        <p:nvGraphicFramePr>
+          <p:cNvPr id="209" name="Table 1"/>
+          <p:cNvGraphicFramePr/>
+          <p:nvPr>
+            <p:extLst>
+              <p:ext uri="{D42A27DB-BD31-4B8C-83A1-F6EECF244321}">
+                <p14:modId xmlns:p14="http://schemas.microsoft.com/office/powerpoint/2010/main" val="4069199133"/>
+              </p:ext>
+            </p:extLst>
+          </p:nvPr>
+        </p:nvGraphicFramePr>
+        <p:xfrm>
+          <a:off x="11520" y="22680"/>
+          <a:ext cx="9085320" cy="5263560"/>
+        </p:xfrm>
+        <a:graphic>
+          <a:graphicData uri="http://schemas.openxmlformats.org/drawingml/2006/table">
+            <a:tbl>
+              <a:tblPr/>
+              <a:tblGrid>
+                <a:gridCol w="1488600">
+                  <a:extLst>
+                    <a:ext uri="{9D8B030D-6E8A-4147-A177-3AD203B41FA5}">
+                      <a16:colId xmlns:a16="http://schemas.microsoft.com/office/drawing/2014/main" val="20000"/>
+                    </a:ext>
+                  </a:extLst>
+                </a:gridCol>
+                <a:gridCol w="7596720">
+                  <a:extLst>
+                    <a:ext uri="{9D8B030D-6E8A-4147-A177-3AD203B41FA5}">
+                      <a16:colId xmlns:a16="http://schemas.microsoft.com/office/drawing/2014/main" val="20001"/>
+                    </a:ext>
+                  </a:extLst>
+                </a:gridCol>
+              </a:tblGrid>
+              <a:tr h="291960">
+                <a:tc>
+                  <a:txBody>
+                    <a:bodyPr/>
+                    <a:lstStyle/>
+                    <a:p>
+                      <a:endParaRPr lang="en-DE"/>
+                    </a:p>
+                  </a:txBody>
+                  <a:tcPr marL="90000" marR="90000">
+                    <a:lnL w="720">
+                      <a:solidFill>
+                        <a:srgbClr val="FFFFFF"/>
+                      </a:solidFill>
+                    </a:lnL>
+                    <a:lnR w="720">
+                      <a:solidFill>
+                        <a:srgbClr val="FFFFFF"/>
+                      </a:solidFill>
+                    </a:lnR>
+                    <a:lnT w="720">
+                      <a:solidFill>
+                        <a:srgbClr val="FFFFFF"/>
+                      </a:solidFill>
+                    </a:lnT>
+                    <a:lnB w="720">
+                      <a:solidFill>
+                        <a:srgbClr val="FFFFFF"/>
+                      </a:solidFill>
+                    </a:lnB>
+                    <a:solidFill>
+                      <a:srgbClr val="B3B3B3"/>
+                    </a:solidFill>
+                  </a:tcPr>
+                </a:tc>
+                <a:tc>
+                  <a:txBody>
+                    <a:bodyPr/>
+                    <a:lstStyle/>
+                    <a:p>
+                      <a:endParaRPr lang="en-DE"/>
+                    </a:p>
+                  </a:txBody>
+                  <a:tcPr marL="90000" marR="90000">
+                    <a:lnL w="720">
+                      <a:solidFill>
+                        <a:srgbClr val="FFFFFF"/>
+                      </a:solidFill>
+                    </a:lnL>
+                    <a:lnR w="720">
+                      <a:solidFill>
+                        <a:srgbClr val="FFFFFF"/>
+                      </a:solidFill>
+                    </a:lnR>
+                    <a:lnT w="720">
+                      <a:solidFill>
+                        <a:srgbClr val="FFFFFF"/>
+                      </a:solidFill>
+                    </a:lnT>
+                    <a:lnB w="720">
+                      <a:solidFill>
+                        <a:srgbClr val="FFFFFF"/>
+                      </a:solidFill>
+                    </a:lnB>
+                    <a:solidFill>
+                      <a:srgbClr val="B3B3B3"/>
+                    </a:solidFill>
+                  </a:tcPr>
+                </a:tc>
+                <a:extLst>
+                  <a:ext uri="{0D108BD9-81ED-4DB2-BD59-A6C34878D82A}">
+                    <a16:rowId xmlns:a16="http://schemas.microsoft.com/office/drawing/2014/main" val="10000"/>
+                  </a:ext>
+                </a:extLst>
+              </a:tr>
+              <a:tr h="484560">
+                <a:tc>
+                  <a:txBody>
+                    <a:bodyPr/>
+                    <a:lstStyle/>
+                    <a:p>
+                      <a:pPr>
+                        <a:lnSpc>
+                          <a:spcPct val="100000"/>
+                        </a:lnSpc>
+                      </a:pPr>
+                      <a:r>
+                        <a:rPr lang="en-US" sz="1200" b="1" strike="noStrike" spc="-1">
+                          <a:solidFill>
+                            <a:srgbClr val="000000"/>
+                          </a:solidFill>
+                          <a:latin typeface="Liberation Sans;Arial"/>
+                        </a:rPr>
+                        <a:t>Title</a:t>
+                      </a:r>
+                      <a:endParaRPr lang="en-US" sz="1200" b="0" strike="noStrike" spc="-1">
+                        <a:latin typeface="Arial"/>
+                      </a:endParaRPr>
+                    </a:p>
+                  </a:txBody>
+                  <a:tcPr marL="90000" marR="90000">
+                    <a:lnL w="720">
+                      <a:solidFill>
+                        <a:srgbClr val="FFFFFF"/>
+                      </a:solidFill>
+                    </a:lnL>
+                    <a:lnR w="720">
+                      <a:solidFill>
+                        <a:srgbClr val="FFFFFF"/>
+                      </a:solidFill>
+                    </a:lnR>
+                    <a:lnT w="720">
+                      <a:solidFill>
+                        <a:srgbClr val="FFFFFF"/>
+                      </a:solidFill>
+                    </a:lnT>
+                    <a:lnB w="720">
+                      <a:solidFill>
+                        <a:srgbClr val="FFFFFF"/>
+                      </a:solidFill>
+                    </a:lnB>
+                    <a:solidFill>
+                      <a:srgbClr val="CCCCCC"/>
+                    </a:solidFill>
+                  </a:tcPr>
+                </a:tc>
+                <a:tc>
+                  <a:txBody>
+                    <a:bodyPr/>
+                    <a:lstStyle/>
+                    <a:p>
+                      <a:pPr>
+                        <a:lnSpc>
+                          <a:spcPct val="100000"/>
+                        </a:lnSpc>
+                      </a:pPr>
+                      <a:r>
+                        <a:rPr lang="en-US" sz="1200" b="1" strike="noStrike" spc="-1" dirty="0">
+                          <a:solidFill>
+                            <a:srgbClr val="000000"/>
+                          </a:solidFill>
+                          <a:latin typeface="Liberation Sans;Arial"/>
+                        </a:rPr>
+                        <a:t>Machine learning for Entity Matching</a:t>
+                      </a:r>
+                      <a:endParaRPr lang="en-US" sz="1200" b="0" strike="noStrike" spc="-1" dirty="0">
+                        <a:latin typeface="Arial"/>
+                      </a:endParaRPr>
+                    </a:p>
+                  </a:txBody>
+                  <a:tcPr marL="90000" marR="90000">
+                    <a:lnL w="720">
+                      <a:solidFill>
+                        <a:srgbClr val="FFFFFF"/>
+                      </a:solidFill>
+                    </a:lnL>
+                    <a:lnR w="720">
+                      <a:solidFill>
+                        <a:srgbClr val="FFFFFF"/>
+                      </a:solidFill>
+                    </a:lnR>
+                    <a:lnT w="720">
+                      <a:solidFill>
+                        <a:srgbClr val="FFFFFF"/>
+                      </a:solidFill>
+                    </a:lnT>
+                    <a:lnB w="720">
+                      <a:solidFill>
+                        <a:srgbClr val="FFFFFF"/>
+                      </a:solidFill>
+                    </a:lnB>
+                    <a:solidFill>
+                      <a:srgbClr val="CCCCCC"/>
+                    </a:solidFill>
+                  </a:tcPr>
+                </a:tc>
+                <a:extLst>
+                  <a:ext uri="{0D108BD9-81ED-4DB2-BD59-A6C34878D82A}">
+                    <a16:rowId xmlns:a16="http://schemas.microsoft.com/office/drawing/2014/main" val="10001"/>
+                  </a:ext>
+                </a:extLst>
+              </a:tr>
+              <a:tr h="1248840">
+                <a:tc>
+                  <a:txBody>
+                    <a:bodyPr/>
+                    <a:lstStyle/>
+                    <a:p>
+                      <a:pPr>
+                        <a:lnSpc>
+                          <a:spcPct val="100000"/>
+                        </a:lnSpc>
+                      </a:pPr>
+                      <a:r>
+                        <a:rPr lang="en-US" sz="1200" b="1" strike="noStrike" spc="-1">
+                          <a:solidFill>
+                            <a:srgbClr val="000000"/>
+                          </a:solidFill>
+                          <a:latin typeface="Liberation Sans;Arial"/>
+                        </a:rPr>
+                        <a:t>Description</a:t>
+                      </a:r>
+                      <a:endParaRPr lang="en-US" sz="1200" b="0" strike="noStrike" spc="-1">
+                        <a:latin typeface="Arial"/>
+                      </a:endParaRPr>
+                    </a:p>
+                  </a:txBody>
+                  <a:tcPr marL="90000" marR="90000">
+                    <a:lnL w="720">
+                      <a:solidFill>
+                        <a:srgbClr val="FFFFFF"/>
+                      </a:solidFill>
+                    </a:lnL>
+                    <a:lnR w="720">
+                      <a:solidFill>
+                        <a:srgbClr val="FFFFFF"/>
+                      </a:solidFill>
+                    </a:lnR>
+                    <a:lnT w="720">
+                      <a:solidFill>
+                        <a:srgbClr val="FFFFFF"/>
+                      </a:solidFill>
+                    </a:lnT>
+                    <a:lnB w="720">
+                      <a:solidFill>
+                        <a:srgbClr val="FFFFFF"/>
+                      </a:solidFill>
+                    </a:lnB>
+                    <a:solidFill>
+                      <a:srgbClr val="E6E6E6"/>
+                    </a:solidFill>
+                  </a:tcPr>
+                </a:tc>
+                <a:tc>
+                  <a:txBody>
+                    <a:bodyPr/>
+                    <a:lstStyle/>
+                    <a:p>
+                      <a:pPr>
+                        <a:lnSpc>
+                          <a:spcPct val="100000"/>
+                        </a:lnSpc>
+                      </a:pPr>
+                      <a:r>
+                        <a:rPr lang="en-US" sz="1200" b="0" strike="noStrike" spc="-1" dirty="0">
+                          <a:solidFill>
+                            <a:srgbClr val="000000"/>
+                          </a:solidFill>
+                          <a:latin typeface="Liberation Sans;Arial"/>
+                        </a:rPr>
+                        <a:t>The objective of this lab is to implement an algorithm for an entity matching. Entity Matching (EM) is the problem of determining if two entities in a data set refer to the same real-world object. Entity matching is a ubiquitous problem that appears in numerous application domains (including image processing, information extraction and integration, and natural language processing), often under different terminology (e.g., coreference resolution, record linkage, and deduplication). Machine learning approaches for entity matching</a:t>
+                      </a:r>
+                    </a:p>
+                    <a:p>
+                      <a:pPr>
+                        <a:lnSpc>
+                          <a:spcPct val="100000"/>
+                        </a:lnSpc>
+                      </a:pPr>
+                      <a:r>
+                        <a:rPr lang="en-US" sz="1200" b="0" strike="noStrike" spc="-1" dirty="0">
+                          <a:solidFill>
+                            <a:srgbClr val="000000"/>
+                          </a:solidFill>
+                          <a:latin typeface="Liberation Sans;Arial"/>
+                        </a:rPr>
+                        <a:t>often learn a classifier over pairs of entities labeling them as duplicate or non-duplicate. Here we focus on implementation of a one specific algorithm using Python and </a:t>
+                      </a:r>
+                      <a:r>
+                        <a:rPr lang="en-US" sz="1200" b="0" strike="noStrike" spc="-1" dirty="0" err="1">
+                          <a:solidFill>
+                            <a:srgbClr val="000000"/>
+                          </a:solidFill>
+                          <a:latin typeface="Liberation Sans;Arial"/>
+                        </a:rPr>
+                        <a:t>PyTorch</a:t>
+                      </a:r>
+                      <a:r>
+                        <a:rPr lang="en-US" sz="1200" b="0" strike="noStrike" spc="-1" dirty="0">
+                          <a:solidFill>
+                            <a:srgbClr val="000000"/>
+                          </a:solidFill>
+                          <a:latin typeface="Liberation Sans;Arial"/>
+                        </a:rPr>
+                        <a:t> on the Knowledge Graphs. The implemented algorithm should work on RDF data.</a:t>
+                      </a:r>
+                    </a:p>
+                    <a:p>
+                      <a:pPr>
+                        <a:lnSpc>
+                          <a:spcPct val="100000"/>
+                        </a:lnSpc>
+                      </a:pPr>
+                      <a:endParaRPr lang="en-US" sz="1200" b="0" strike="noStrike" spc="-1" dirty="0">
+                        <a:latin typeface="Arial"/>
+                      </a:endParaRPr>
+                    </a:p>
+                  </a:txBody>
+                  <a:tcPr marL="90000" marR="90000">
+                    <a:lnL w="720">
+                      <a:solidFill>
+                        <a:srgbClr val="FFFFFF"/>
+                      </a:solidFill>
+                    </a:lnL>
+                    <a:lnR w="720">
+                      <a:solidFill>
+                        <a:srgbClr val="FFFFFF"/>
+                      </a:solidFill>
+                    </a:lnR>
+                    <a:lnT w="720">
+                      <a:solidFill>
+                        <a:srgbClr val="FFFFFF"/>
+                      </a:solidFill>
+                    </a:lnT>
+                    <a:lnB w="720">
+                      <a:solidFill>
+                        <a:srgbClr val="FFFFFF"/>
+                      </a:solidFill>
+                    </a:lnB>
+                    <a:solidFill>
+                      <a:srgbClr val="E6E6E6"/>
+                    </a:solidFill>
+                  </a:tcPr>
+                </a:tc>
+                <a:extLst>
+                  <a:ext uri="{0D108BD9-81ED-4DB2-BD59-A6C34878D82A}">
+                    <a16:rowId xmlns:a16="http://schemas.microsoft.com/office/drawing/2014/main" val="10002"/>
+                  </a:ext>
+                </a:extLst>
+              </a:tr>
+              <a:tr h="675720">
+                <a:tc>
+                  <a:txBody>
+                    <a:bodyPr/>
+                    <a:lstStyle/>
+                    <a:p>
+                      <a:pPr>
+                        <a:lnSpc>
+                          <a:spcPct val="100000"/>
+                        </a:lnSpc>
+                      </a:pPr>
+                      <a:r>
+                        <a:rPr lang="en-US" sz="1200" b="1" strike="noStrike" spc="-1">
+                          <a:solidFill>
+                            <a:srgbClr val="000000"/>
+                          </a:solidFill>
+                          <a:latin typeface="Liberation Sans;Arial"/>
+                        </a:rPr>
+                        <a:t>Prerequisite</a:t>
+                      </a:r>
+                      <a:endParaRPr lang="en-US" sz="1200" b="0" strike="noStrike" spc="-1">
+                        <a:latin typeface="Arial"/>
+                      </a:endParaRPr>
+                    </a:p>
+                  </a:txBody>
+                  <a:tcPr marL="90000" marR="90000">
+                    <a:lnL w="720">
+                      <a:solidFill>
+                        <a:srgbClr val="FFFFFF"/>
+                      </a:solidFill>
+                    </a:lnL>
+                    <a:lnR w="720">
+                      <a:solidFill>
+                        <a:srgbClr val="FFFFFF"/>
+                      </a:solidFill>
+                    </a:lnR>
+                    <a:lnT w="720">
+                      <a:solidFill>
+                        <a:srgbClr val="FFFFFF"/>
+                      </a:solidFill>
+                    </a:lnT>
+                    <a:lnB w="720">
+                      <a:solidFill>
+                        <a:srgbClr val="FFFFFF"/>
+                      </a:solidFill>
+                    </a:lnB>
+                    <a:solidFill>
+                      <a:srgbClr val="CCCCCC"/>
+                    </a:solidFill>
+                  </a:tcPr>
+                </a:tc>
+                <a:tc>
+                  <a:txBody>
+                    <a:bodyPr/>
+                    <a:lstStyle/>
+                    <a:p>
+                      <a:pPr>
+                        <a:lnSpc>
+                          <a:spcPct val="100000"/>
+                        </a:lnSpc>
+                      </a:pPr>
+                      <a:r>
+                        <a:rPr lang="en-US" sz="1200" b="0" strike="noStrike" spc="-1" dirty="0">
+                          <a:solidFill>
+                            <a:srgbClr val="000000"/>
+                          </a:solidFill>
+                          <a:latin typeface="Liberation Sans;Arial"/>
+                        </a:rPr>
+                        <a:t>Semantic RDF data, basic knowledge in machine learning, Python, Knowledge in software engineering</a:t>
+                      </a:r>
+                      <a:endParaRPr lang="en-US" sz="1200" b="0" strike="noStrike" spc="-1" dirty="0">
+                        <a:latin typeface="Arial"/>
+                      </a:endParaRPr>
+                    </a:p>
+                  </a:txBody>
+                  <a:tcPr marL="90000" marR="90000">
+                    <a:lnL w="720">
+                      <a:solidFill>
+                        <a:srgbClr val="FFFFFF"/>
+                      </a:solidFill>
+                    </a:lnL>
+                    <a:lnR w="720">
+                      <a:solidFill>
+                        <a:srgbClr val="FFFFFF"/>
+                      </a:solidFill>
+                    </a:lnR>
+                    <a:lnT w="720">
+                      <a:solidFill>
+                        <a:srgbClr val="FFFFFF"/>
+                      </a:solidFill>
+                    </a:lnT>
+                    <a:lnB w="720">
+                      <a:solidFill>
+                        <a:srgbClr val="FFFFFF"/>
+                      </a:solidFill>
+                    </a:lnB>
+                    <a:solidFill>
+                      <a:srgbClr val="CCCCCC"/>
+                    </a:solidFill>
+                  </a:tcPr>
+                </a:tc>
+                <a:extLst>
+                  <a:ext uri="{0D108BD9-81ED-4DB2-BD59-A6C34878D82A}">
+                    <a16:rowId xmlns:a16="http://schemas.microsoft.com/office/drawing/2014/main" val="10003"/>
+                  </a:ext>
+                </a:extLst>
+              </a:tr>
+              <a:tr h="675720">
+                <a:tc>
+                  <a:txBody>
+                    <a:bodyPr/>
+                    <a:lstStyle/>
+                    <a:p>
+                      <a:pPr>
+                        <a:lnSpc>
+                          <a:spcPct val="100000"/>
+                        </a:lnSpc>
+                      </a:pPr>
+                      <a:r>
+                        <a:rPr lang="en-US" sz="1200" b="1" strike="noStrike" spc="-1">
+                          <a:solidFill>
+                            <a:srgbClr val="000000"/>
+                          </a:solidFill>
+                          <a:latin typeface="Liberation Sans;Arial"/>
+                        </a:rPr>
+                        <a:t>Deliverable</a:t>
+                      </a:r>
+                      <a:endParaRPr lang="en-US" sz="1200" b="0" strike="noStrike" spc="-1">
+                        <a:latin typeface="Arial"/>
+                      </a:endParaRPr>
+                    </a:p>
+                  </a:txBody>
+                  <a:tcPr marL="90000" marR="90000">
+                    <a:lnL w="720">
+                      <a:solidFill>
+                        <a:srgbClr val="FFFFFF"/>
+                      </a:solidFill>
+                    </a:lnL>
+                    <a:lnR w="720">
+                      <a:solidFill>
+                        <a:srgbClr val="FFFFFF"/>
+                      </a:solidFill>
+                    </a:lnR>
+                    <a:lnT w="720">
+                      <a:solidFill>
+                        <a:srgbClr val="FFFFFF"/>
+                      </a:solidFill>
+                    </a:lnT>
+                    <a:lnB w="720">
+                      <a:solidFill>
+                        <a:srgbClr val="FFFFFF"/>
+                      </a:solidFill>
+                    </a:lnB>
+                    <a:solidFill>
+                      <a:srgbClr val="E6E6E6"/>
+                    </a:solidFill>
+                  </a:tcPr>
+                </a:tc>
+                <a:tc>
+                  <a:txBody>
+                    <a:bodyPr/>
+                    <a:lstStyle/>
+                    <a:p>
+                      <a:pPr marL="171450" indent="-171450">
+                        <a:lnSpc>
+                          <a:spcPct val="100000"/>
+                        </a:lnSpc>
+                        <a:buFont typeface="Arial" panose="020B0604020202020204" pitchFamily="34" charset="0"/>
+                        <a:buChar char="•"/>
+                      </a:pPr>
+                      <a:r>
+                        <a:rPr lang="en-US" sz="1200" b="0" strike="noStrike" spc="-1" dirty="0">
+                          <a:solidFill>
+                            <a:srgbClr val="000000"/>
+                          </a:solidFill>
+                          <a:latin typeface="Liberation Sans;Arial"/>
+                        </a:rPr>
+                        <a:t>Project Code to be used as an API (to be called from different projects)</a:t>
+                      </a:r>
+                    </a:p>
+                    <a:p>
+                      <a:pPr marL="171450" indent="-171450">
+                        <a:lnSpc>
+                          <a:spcPct val="100000"/>
+                        </a:lnSpc>
+                        <a:buFont typeface="Arial" panose="020B0604020202020204" pitchFamily="34" charset="0"/>
+                        <a:buChar char="•"/>
+                      </a:pPr>
+                      <a:r>
+                        <a:rPr lang="en-US" sz="1200" b="0" strike="noStrike" spc="-1" dirty="0">
+                          <a:solidFill>
+                            <a:srgbClr val="000000"/>
+                          </a:solidFill>
+                          <a:latin typeface="Liberation Sans;Arial"/>
+                        </a:rPr>
+                        <a:t>Documentation of the functionalities implemented and if there a specific installation required.</a:t>
+                      </a:r>
+                    </a:p>
+                    <a:p>
+                      <a:pPr marL="171450" indent="-171450">
+                        <a:lnSpc>
+                          <a:spcPct val="100000"/>
+                        </a:lnSpc>
+                        <a:buFont typeface="Arial" panose="020B0604020202020204" pitchFamily="34" charset="0"/>
+                        <a:buChar char="•"/>
+                      </a:pPr>
+                      <a:r>
+                        <a:rPr lang="en-US" sz="1200" b="0" strike="noStrike" spc="-1" dirty="0">
+                          <a:solidFill>
+                            <a:srgbClr val="000000"/>
+                          </a:solidFill>
+                          <a:latin typeface="Liberation Sans;Arial"/>
+                        </a:rPr>
+                        <a:t>Final presentation describing the overall work with a demo.</a:t>
+                      </a:r>
+                    </a:p>
+                  </a:txBody>
+                  <a:tcPr marL="90000" marR="90000">
+                    <a:lnL w="720">
+                      <a:solidFill>
+                        <a:srgbClr val="FFFFFF"/>
+                      </a:solidFill>
+                    </a:lnL>
+                    <a:lnR w="720">
+                      <a:solidFill>
+                        <a:srgbClr val="FFFFFF"/>
+                      </a:solidFill>
+                    </a:lnR>
+                    <a:lnT w="720">
+                      <a:solidFill>
+                        <a:srgbClr val="FFFFFF"/>
+                      </a:solidFill>
+                    </a:lnT>
+                    <a:lnB w="720">
+                      <a:solidFill>
+                        <a:srgbClr val="FFFFFF"/>
+                      </a:solidFill>
+                    </a:lnB>
+                    <a:solidFill>
+                      <a:srgbClr val="E6E6E6"/>
+                    </a:solidFill>
+                  </a:tcPr>
+                </a:tc>
+                <a:extLst>
+                  <a:ext uri="{0D108BD9-81ED-4DB2-BD59-A6C34878D82A}">
+                    <a16:rowId xmlns:a16="http://schemas.microsoft.com/office/drawing/2014/main" val="10004"/>
+                  </a:ext>
+                </a:extLst>
+              </a:tr>
+              <a:tr h="484560">
+                <a:tc>
+                  <a:txBody>
+                    <a:bodyPr/>
+                    <a:lstStyle/>
+                    <a:p>
+                      <a:pPr>
+                        <a:lnSpc>
+                          <a:spcPct val="100000"/>
+                        </a:lnSpc>
+                      </a:pPr>
+                      <a:r>
+                        <a:rPr lang="en-US" sz="1200" b="1" strike="noStrike" spc="-1" dirty="0">
+                          <a:solidFill>
+                            <a:srgbClr val="000000"/>
+                          </a:solidFill>
+                          <a:latin typeface="Liberation Sans;Arial"/>
+                        </a:rPr>
+                        <a:t>Training</a:t>
+                      </a:r>
+                      <a:endParaRPr lang="en-US" sz="1200" b="0" strike="noStrike" spc="-1" dirty="0">
+                        <a:latin typeface="Arial"/>
+                      </a:endParaRPr>
+                    </a:p>
+                  </a:txBody>
+                  <a:tcPr marL="90000" marR="90000">
+                    <a:lnL w="720">
+                      <a:solidFill>
+                        <a:srgbClr val="FFFFFF"/>
+                      </a:solidFill>
+                    </a:lnL>
+                    <a:lnR w="720">
+                      <a:solidFill>
+                        <a:srgbClr val="FFFFFF"/>
+                      </a:solidFill>
+                    </a:lnR>
+                    <a:lnT w="720">
+                      <a:solidFill>
+                        <a:srgbClr val="FFFFFF"/>
+                      </a:solidFill>
+                    </a:lnT>
+                    <a:lnB w="720">
+                      <a:solidFill>
+                        <a:srgbClr val="FFFFFF"/>
+                      </a:solidFill>
+                    </a:lnB>
+                    <a:solidFill>
+                      <a:srgbClr val="CCCCCC"/>
+                    </a:solidFill>
+                  </a:tcPr>
+                </a:tc>
+                <a:tc>
+                  <a:txBody>
+                    <a:bodyPr/>
+                    <a:lstStyle/>
+                    <a:p>
+                      <a:pPr>
+                        <a:lnSpc>
+                          <a:spcPct val="100000"/>
+                        </a:lnSpc>
+                      </a:pPr>
+                      <a:r>
+                        <a:rPr lang="en-US" sz="1200" b="0" strike="noStrike" spc="-1" dirty="0">
+                          <a:solidFill>
+                            <a:srgbClr val="000000"/>
+                          </a:solidFill>
+                          <a:latin typeface="Liberation Sans;Arial"/>
+                        </a:rPr>
+                        <a:t>Two weeks training on </a:t>
+                      </a:r>
+                      <a:r>
+                        <a:rPr lang="en-US" sz="1200" b="0" strike="noStrike" spc="-1" dirty="0" err="1">
+                          <a:solidFill>
+                            <a:srgbClr val="000000"/>
+                          </a:solidFill>
+                          <a:latin typeface="Liberation Sans;Arial"/>
+                        </a:rPr>
+                        <a:t>PyTorch</a:t>
+                      </a:r>
+                      <a:endParaRPr lang="en-US" sz="1200" b="0" strike="noStrike" spc="-1" dirty="0">
+                        <a:latin typeface="Arial"/>
+                      </a:endParaRPr>
+                    </a:p>
+                  </a:txBody>
+                  <a:tcPr marL="90000" marR="90000">
+                    <a:lnL w="720">
+                      <a:solidFill>
+                        <a:srgbClr val="FFFFFF"/>
+                      </a:solidFill>
+                    </a:lnL>
+                    <a:lnR w="720">
+                      <a:solidFill>
+                        <a:srgbClr val="FFFFFF"/>
+                      </a:solidFill>
+                    </a:lnR>
+                    <a:lnT w="720">
+                      <a:solidFill>
+                        <a:srgbClr val="FFFFFF"/>
+                      </a:solidFill>
+                    </a:lnT>
+                    <a:lnB w="720">
+                      <a:solidFill>
+                        <a:srgbClr val="FFFFFF"/>
+                      </a:solidFill>
+                    </a:lnB>
+                    <a:solidFill>
+                      <a:srgbClr val="CCCCCC"/>
+                    </a:solidFill>
+                  </a:tcPr>
+                </a:tc>
+                <a:extLst>
+                  <a:ext uri="{0D108BD9-81ED-4DB2-BD59-A6C34878D82A}">
+                    <a16:rowId xmlns:a16="http://schemas.microsoft.com/office/drawing/2014/main" val="10005"/>
+                  </a:ext>
+                </a:extLst>
+              </a:tr>
+              <a:tr h="293760">
+                <a:tc>
+                  <a:txBody>
+                    <a:bodyPr/>
+                    <a:lstStyle/>
+                    <a:p>
+                      <a:pPr>
+                        <a:lnSpc>
+                          <a:spcPct val="100000"/>
+                        </a:lnSpc>
+                      </a:pPr>
+                      <a:r>
+                        <a:rPr lang="en-US" sz="1200" b="1" strike="noStrike" spc="-1">
+                          <a:solidFill>
+                            <a:srgbClr val="000000"/>
+                          </a:solidFill>
+                          <a:latin typeface="Liberation Sans;Arial"/>
+                        </a:rPr>
+                        <a:t>Documentation</a:t>
+                      </a:r>
+                      <a:endParaRPr lang="en-US" sz="1200" b="0" strike="noStrike" spc="-1">
+                        <a:latin typeface="Arial"/>
+                      </a:endParaRPr>
+                    </a:p>
+                  </a:txBody>
+                  <a:tcPr marL="90000" marR="90000">
+                    <a:lnL w="720">
+                      <a:solidFill>
+                        <a:srgbClr val="FFFFFF"/>
+                      </a:solidFill>
+                    </a:lnL>
+                    <a:lnR w="720">
+                      <a:solidFill>
+                        <a:srgbClr val="FFFFFF"/>
+                      </a:solidFill>
+                    </a:lnR>
+                    <a:lnT w="720">
+                      <a:solidFill>
+                        <a:srgbClr val="FFFFFF"/>
+                      </a:solidFill>
+                    </a:lnT>
+                    <a:lnB w="720">
+                      <a:solidFill>
+                        <a:srgbClr val="FFFFFF"/>
+                      </a:solidFill>
+                    </a:lnB>
+                    <a:solidFill>
+                      <a:srgbClr val="E6E6E6"/>
+                    </a:solidFill>
+                  </a:tcPr>
+                </a:tc>
+                <a:tc>
+                  <a:txBody>
+                    <a:bodyPr/>
+                    <a:lstStyle/>
+                    <a:p>
+                      <a:pPr>
+                        <a:lnSpc>
+                          <a:spcPct val="100000"/>
+                        </a:lnSpc>
+                      </a:pPr>
+                      <a:r>
+                        <a:rPr lang="en-US" sz="1200" b="0" strike="noStrike" spc="-1">
+                          <a:solidFill>
+                            <a:srgbClr val="000000"/>
+                          </a:solidFill>
+                          <a:latin typeface="Liberation Sans;Arial"/>
+                        </a:rPr>
+                        <a:t>Required with no restrictions or preferences</a:t>
+                      </a:r>
+                      <a:endParaRPr lang="en-US" sz="1200" b="0" strike="noStrike" spc="-1">
+                        <a:latin typeface="Arial"/>
+                      </a:endParaRPr>
+                    </a:p>
+                  </a:txBody>
+                  <a:tcPr marL="90000" marR="90000">
+                    <a:lnL w="720">
+                      <a:solidFill>
+                        <a:srgbClr val="FFFFFF"/>
+                      </a:solidFill>
+                    </a:lnL>
+                    <a:lnR w="720">
+                      <a:solidFill>
+                        <a:srgbClr val="FFFFFF"/>
+                      </a:solidFill>
+                    </a:lnR>
+                    <a:lnT w="720">
+                      <a:solidFill>
+                        <a:srgbClr val="FFFFFF"/>
+                      </a:solidFill>
+                    </a:lnT>
+                    <a:lnB w="720">
+                      <a:solidFill>
+                        <a:srgbClr val="FFFFFF"/>
+                      </a:solidFill>
+                    </a:lnB>
+                    <a:solidFill>
+                      <a:srgbClr val="E6E6E6"/>
+                    </a:solidFill>
+                  </a:tcPr>
+                </a:tc>
+                <a:extLst>
+                  <a:ext uri="{0D108BD9-81ED-4DB2-BD59-A6C34878D82A}">
+                    <a16:rowId xmlns:a16="http://schemas.microsoft.com/office/drawing/2014/main" val="10006"/>
+                  </a:ext>
+                </a:extLst>
+              </a:tr>
+              <a:tr h="546120">
+                <a:tc>
+                  <a:txBody>
+                    <a:bodyPr/>
+                    <a:lstStyle/>
+                    <a:p>
+                      <a:pPr>
+                        <a:lnSpc>
+                          <a:spcPct val="100000"/>
+                        </a:lnSpc>
+                      </a:pPr>
+                      <a:r>
+                        <a:rPr lang="en-US" sz="1200" b="1" strike="noStrike" spc="-1">
+                          <a:solidFill>
+                            <a:srgbClr val="000000"/>
+                          </a:solidFill>
+                          <a:latin typeface="Liberation Sans;Arial"/>
+                        </a:rPr>
+                        <a:t>Bonus work</a:t>
+                      </a:r>
+                      <a:endParaRPr lang="en-US" sz="1200" b="0" strike="noStrike" spc="-1">
+                        <a:latin typeface="Arial"/>
+                      </a:endParaRPr>
+                    </a:p>
+                  </a:txBody>
+                  <a:tcPr marL="90000" marR="90000">
+                    <a:lnL w="720">
+                      <a:solidFill>
+                        <a:srgbClr val="FFFFFF"/>
+                      </a:solidFill>
+                    </a:lnL>
+                    <a:lnR w="720">
+                      <a:solidFill>
+                        <a:srgbClr val="FFFFFF"/>
+                      </a:solidFill>
+                    </a:lnR>
+                    <a:lnT w="720">
+                      <a:solidFill>
+                        <a:srgbClr val="FFFFFF"/>
+                      </a:solidFill>
+                    </a:lnT>
+                    <a:lnB w="720">
+                      <a:solidFill>
+                        <a:srgbClr val="FFFFFF"/>
+                      </a:solidFill>
+                    </a:lnB>
+                    <a:solidFill>
+                      <a:srgbClr val="CCCCCC"/>
+                    </a:solidFill>
+                  </a:tcPr>
+                </a:tc>
+                <a:tc>
+                  <a:txBody>
+                    <a:bodyPr/>
+                    <a:lstStyle/>
+                    <a:p>
+                      <a:pPr marL="0" indent="0">
+                        <a:lnSpc>
+                          <a:spcPct val="100000"/>
+                        </a:lnSpc>
+                        <a:buClr>
+                          <a:srgbClr val="000000"/>
+                        </a:buClr>
+                        <a:buFont typeface="Wingdings" charset="2"/>
+                        <a:buNone/>
+                      </a:pPr>
+                      <a:r>
+                        <a:rPr lang="en-US" sz="1200" b="0" strike="noStrike" spc="-1" dirty="0">
+                          <a:latin typeface="+mn-lt"/>
+                        </a:rPr>
+                        <a:t>Testing the algorithm on 3 different benchmark types. </a:t>
+                      </a:r>
+                      <a:endParaRPr lang="en-US" sz="1200" b="0" strike="noStrike" spc="-1" dirty="0">
+                        <a:latin typeface="Arial"/>
+                      </a:endParaRPr>
+                    </a:p>
+                  </a:txBody>
+                  <a:tcPr marL="90000" marR="90000">
+                    <a:lnL w="720">
+                      <a:solidFill>
+                        <a:srgbClr val="FFFFFF"/>
+                      </a:solidFill>
+                    </a:lnL>
+                    <a:lnR w="720">
+                      <a:solidFill>
+                        <a:srgbClr val="FFFFFF"/>
+                      </a:solidFill>
+                    </a:lnR>
+                    <a:lnT w="720">
+                      <a:solidFill>
+                        <a:srgbClr val="FFFFFF"/>
+                      </a:solidFill>
+                    </a:lnT>
+                    <a:lnB w="720">
+                      <a:solidFill>
+                        <a:srgbClr val="FFFFFF"/>
+                      </a:solidFill>
+                    </a:lnB>
+                    <a:solidFill>
+                      <a:srgbClr val="CCCCCC"/>
+                    </a:solidFill>
+                  </a:tcPr>
+                </a:tc>
+                <a:extLst>
+                  <a:ext uri="{0D108BD9-81ED-4DB2-BD59-A6C34878D82A}">
+                    <a16:rowId xmlns:a16="http://schemas.microsoft.com/office/drawing/2014/main" val="10007"/>
+                  </a:ext>
+                </a:extLst>
+              </a:tr>
+            </a:tbl>
+          </a:graphicData>
+        </a:graphic>
+      </p:graphicFrame>
+    </p:spTree>
+    <p:extLst>
+      <p:ext uri="{BB962C8B-B14F-4D97-AF65-F5344CB8AC3E}">
+        <p14:creationId xmlns:p14="http://schemas.microsoft.com/office/powerpoint/2010/main" val="1868904878"/>
+      </p:ext>
+    </p:extLst>
+  </p:cSld>
+  <p:clrMapOvr>
+    <a:masterClrMapping/>
+  </p:clrMapOvr>
+  <p:timing>
+    <p:tnLst>
+      <p:par>
+        <p:cTn id="1" dur="indefinite" restart="never" nodeType="tmRoot">
+          <p:childTnLst>
+            <p:seq>
+              <p:cTn id="2" dur="indefinite" nodeType="mainSeq"/>
+              <p:prevCondLst>
+                <p:cond evt="onPrev" delay="0">
+                  <p:tgtEl>
+                    <p:sldTgt/>
+                  </p:tgtEl>
+                </p:cond>
+              </p:prevCondLst>
+              <p:nextCondLst>
+                <p:cond evt="onNext" delay="0">
+                  <p:tgtEl>
+                    <p:sldTgt/>
+                  </p:tgtEl>
+                </p:cond>
+              </p:nextCondLst>
+            </p:seq>
+          </p:childTnLst>
+        </p:cTn>
+      </p:par>
+    </p:tnLst>
+  </p:timing>
+</p:sld>
+</file>
+
+<file path=ppt/slides/slide26.xml><?xml version="1.0" encoding="utf-8"?>
 <p:sld xmlns:a="http://schemas.openxmlformats.org/drawingml/2006/main" xmlns:r="http://schemas.openxmlformats.org/officeDocument/2006/relationships" xmlns:p="http://schemas.openxmlformats.org/presentationml/2006/main">
   <p:cSld>
     <p:spTree>
@@ -16258,7 +18007,7 @@
 </p:sld>
 </file>
 
-<file path=ppt/slides/slide24.xml><?xml version="1.0" encoding="utf-8"?>
+<file path=ppt/slides/slide27.xml><?xml version="1.0" encoding="utf-8"?>
 <p:sld xmlns:a="http://schemas.openxmlformats.org/drawingml/2006/main" xmlns:r="http://schemas.openxmlformats.org/officeDocument/2006/relationships" xmlns:p="http://schemas.openxmlformats.org/presentationml/2006/main">
   <p:cSld>
     <p:spTree>
@@ -16600,6 +18349,476 @@
               </a:lnSpc>
             </a:pPr>
             <a:r>
+              <a:rPr lang="en-US" sz="3300" b="1" strike="noStrike" spc="-1" dirty="0">
+                <a:solidFill>
+                  <a:srgbClr val="000000"/>
+                </a:solidFill>
+                <a:latin typeface="Calibri"/>
+                <a:ea typeface="Calibri"/>
+              </a:rPr>
+              <a:t>Short Introduction</a:t>
+            </a:r>
+            <a:endParaRPr lang="en-US" sz="3300" b="0" strike="noStrike" spc="-1" dirty="0">
+              <a:latin typeface="Arial"/>
+            </a:endParaRPr>
+          </a:p>
+        </p:txBody>
+      </p:sp>
+      <p:sp>
+        <p:nvSpPr>
+          <p:cNvPr id="177" name="CustomShape 2"/>
+          <p:cNvSpPr/>
+          <p:nvPr/>
+        </p:nvSpPr>
+        <p:spPr>
+          <a:xfrm>
+            <a:off x="628560" y="907560"/>
+            <a:ext cx="7886160" cy="3728520"/>
+          </a:xfrm>
+          <a:prstGeom prst="rect">
+            <a:avLst/>
+          </a:prstGeom>
+          <a:noFill/>
+          <a:ln>
+            <a:noFill/>
+          </a:ln>
+        </p:spPr>
+        <p:style>
+          <a:lnRef idx="0">
+            <a:scrgbClr r="0" g="0" b="0"/>
+          </a:lnRef>
+          <a:fillRef idx="0">
+            <a:scrgbClr r="0" g="0" b="0"/>
+          </a:fillRef>
+          <a:effectRef idx="0">
+            <a:scrgbClr r="0" g="0" b="0"/>
+          </a:effectRef>
+          <a:fontRef idx="minor"/>
+        </p:style>
+        <p:txBody>
+          <a:bodyPr lIns="68400" tIns="68400" rIns="68400" bIns="68400"/>
+          <a:lstStyle/>
+          <a:p>
+            <a:pPr marL="457200" indent="-361080">
+              <a:lnSpc>
+                <a:spcPct val="90000"/>
+              </a:lnSpc>
+              <a:spcBef>
+                <a:spcPts val="799"/>
+              </a:spcBef>
+              <a:buClr>
+                <a:srgbClr val="1F3864"/>
+              </a:buClr>
+              <a:buFont typeface="Arial"/>
+              <a:buChar char="•"/>
+            </a:pPr>
+            <a:r>
+              <a:rPr lang="en-US" sz="2100" b="0" strike="noStrike" spc="-1" dirty="0">
+                <a:solidFill>
+                  <a:srgbClr val="000000"/>
+                </a:solidFill>
+                <a:latin typeface="Calibri"/>
+                <a:ea typeface="Calibri"/>
+              </a:rPr>
+              <a:t>My name is Tobias Grubenmann, feel free to call me “Tobi”</a:t>
+            </a:r>
+          </a:p>
+          <a:p>
+            <a:pPr marL="457200" indent="-361080">
+              <a:lnSpc>
+                <a:spcPct val="90000"/>
+              </a:lnSpc>
+              <a:spcBef>
+                <a:spcPts val="799"/>
+              </a:spcBef>
+              <a:buClr>
+                <a:srgbClr val="1F3864"/>
+              </a:buClr>
+              <a:buFont typeface="Arial"/>
+              <a:buChar char="•"/>
+            </a:pPr>
+            <a:r>
+              <a:rPr lang="en-US" sz="2100" spc="-1" dirty="0">
+                <a:solidFill>
+                  <a:srgbClr val="000000"/>
+                </a:solidFill>
+                <a:latin typeface="Calibri"/>
+              </a:rPr>
+              <a:t>I’m form Liechtenstein.</a:t>
+            </a:r>
+          </a:p>
+          <a:p>
+            <a:pPr marL="457200" indent="-361080">
+              <a:lnSpc>
+                <a:spcPct val="90000"/>
+              </a:lnSpc>
+              <a:spcBef>
+                <a:spcPts val="799"/>
+              </a:spcBef>
+              <a:buClr>
+                <a:srgbClr val="1F3864"/>
+              </a:buClr>
+              <a:buFont typeface="Arial"/>
+              <a:buChar char="•"/>
+            </a:pPr>
+            <a:r>
+              <a:rPr lang="en-US" sz="2100" b="0" strike="noStrike" spc="-1" dirty="0">
+                <a:solidFill>
+                  <a:srgbClr val="000000"/>
+                </a:solidFill>
+                <a:latin typeface="Calibri"/>
+              </a:rPr>
+              <a:t>I did my PhD at the University of Zurich, Switzerland</a:t>
+            </a:r>
+          </a:p>
+          <a:p>
+            <a:pPr marL="457200" indent="-361080">
+              <a:lnSpc>
+                <a:spcPct val="90000"/>
+              </a:lnSpc>
+              <a:spcBef>
+                <a:spcPts val="799"/>
+              </a:spcBef>
+              <a:buClr>
+                <a:srgbClr val="1F3864"/>
+              </a:buClr>
+              <a:buFont typeface="Arial"/>
+              <a:buChar char="•"/>
+            </a:pPr>
+            <a:r>
+              <a:rPr lang="en-US" sz="2100" spc="-1" dirty="0">
+                <a:solidFill>
+                  <a:srgbClr val="000000"/>
+                </a:solidFill>
+                <a:latin typeface="Calibri"/>
+              </a:rPr>
+              <a:t>I did a Postdoc at the University of Hong Kong, China</a:t>
+            </a:r>
+          </a:p>
+          <a:p>
+            <a:pPr marL="457200" indent="-361080">
+              <a:lnSpc>
+                <a:spcPct val="90000"/>
+              </a:lnSpc>
+              <a:spcBef>
+                <a:spcPts val="799"/>
+              </a:spcBef>
+              <a:buClr>
+                <a:srgbClr val="1F3864"/>
+              </a:buClr>
+              <a:buFont typeface="Arial"/>
+              <a:buChar char="•"/>
+            </a:pPr>
+            <a:r>
+              <a:rPr lang="en-US" sz="2100" b="0" strike="noStrike" spc="-1" dirty="0">
+                <a:solidFill>
+                  <a:srgbClr val="000000"/>
+                </a:solidFill>
+                <a:latin typeface="Calibri"/>
+              </a:rPr>
+              <a:t>I joined the University of Bonn in April 2020.</a:t>
+            </a:r>
+          </a:p>
+          <a:p>
+            <a:pPr marL="457200" indent="-361080">
+              <a:lnSpc>
+                <a:spcPct val="90000"/>
+              </a:lnSpc>
+              <a:spcBef>
+                <a:spcPts val="799"/>
+              </a:spcBef>
+              <a:buClr>
+                <a:srgbClr val="1F3864"/>
+              </a:buClr>
+              <a:buFont typeface="Arial"/>
+              <a:buChar char="•"/>
+            </a:pPr>
+            <a:r>
+              <a:rPr lang="en-US" sz="2100" spc="-1" dirty="0">
+                <a:solidFill>
+                  <a:srgbClr val="000000"/>
+                </a:solidFill>
+                <a:latin typeface="Calibri"/>
+              </a:rPr>
+              <a:t>You can reach me at: </a:t>
+            </a:r>
+            <a:r>
+              <a:rPr lang="en-US" sz="2100" spc="-1" dirty="0">
+                <a:solidFill>
+                  <a:srgbClr val="000000"/>
+                </a:solidFill>
+                <a:latin typeface="Calibri"/>
+                <a:hlinkClick r:id="rId2"/>
+              </a:rPr>
+              <a:t>grubenmann@cs.uni-bonn.de</a:t>
+            </a:r>
+            <a:endParaRPr lang="en-US" sz="2100" spc="-1" dirty="0">
+              <a:solidFill>
+                <a:srgbClr val="000000"/>
+              </a:solidFill>
+              <a:latin typeface="Calibri"/>
+            </a:endParaRPr>
+          </a:p>
+          <a:p>
+            <a:pPr marL="457200" indent="-361080">
+              <a:lnSpc>
+                <a:spcPct val="90000"/>
+              </a:lnSpc>
+              <a:spcBef>
+                <a:spcPts val="799"/>
+              </a:spcBef>
+              <a:buClr>
+                <a:srgbClr val="1F3864"/>
+              </a:buClr>
+              <a:buFont typeface="Arial"/>
+              <a:buChar char="•"/>
+            </a:pPr>
+            <a:endParaRPr lang="en-US" sz="2100" spc="-1" dirty="0">
+              <a:solidFill>
+                <a:srgbClr val="000000"/>
+              </a:solidFill>
+              <a:latin typeface="Calibri"/>
+            </a:endParaRPr>
+          </a:p>
+          <a:p>
+            <a:pPr marL="457200" indent="-361080">
+              <a:lnSpc>
+                <a:spcPct val="90000"/>
+              </a:lnSpc>
+              <a:spcBef>
+                <a:spcPts val="799"/>
+              </a:spcBef>
+              <a:buClr>
+                <a:srgbClr val="1F3864"/>
+              </a:buClr>
+              <a:buFont typeface="Arial"/>
+              <a:buChar char="•"/>
+            </a:pPr>
+            <a:endParaRPr lang="en-US" sz="2100" b="0" strike="noStrike" spc="-1" dirty="0">
+              <a:latin typeface="Arial"/>
+            </a:endParaRPr>
+          </a:p>
+          <a:p>
+            <a:pPr>
+              <a:lnSpc>
+                <a:spcPct val="90000"/>
+              </a:lnSpc>
+              <a:spcBef>
+                <a:spcPts val="799"/>
+              </a:spcBef>
+            </a:pPr>
+            <a:endParaRPr lang="en-US" sz="2100" b="0" strike="noStrike" spc="-1" dirty="0">
+              <a:latin typeface="Arial"/>
+            </a:endParaRPr>
+          </a:p>
+        </p:txBody>
+      </p:sp>
+    </p:spTree>
+    <p:extLst>
+      <p:ext uri="{BB962C8B-B14F-4D97-AF65-F5344CB8AC3E}">
+        <p14:creationId xmlns:p14="http://schemas.microsoft.com/office/powerpoint/2010/main" val="1120272819"/>
+      </p:ext>
+    </p:extLst>
+  </p:cSld>
+  <p:clrMapOvr>
+    <a:masterClrMapping/>
+  </p:clrMapOvr>
+  <p:timing>
+    <p:tnLst>
+      <p:par>
+        <p:cTn id="1" dur="indefinite" restart="never" nodeType="tmRoot">
+          <p:childTnLst>
+            <p:seq>
+              <p:cTn id="2" dur="indefinite" nodeType="mainSeq"/>
+              <p:prevCondLst>
+                <p:cond evt="onPrev" delay="0">
+                  <p:tgtEl>
+                    <p:sldTgt/>
+                  </p:tgtEl>
+                </p:cond>
+              </p:prevCondLst>
+              <p:nextCondLst>
+                <p:cond evt="onNext" delay="0">
+                  <p:tgtEl>
+                    <p:sldTgt/>
+                  </p:tgtEl>
+                </p:cond>
+              </p:nextCondLst>
+            </p:seq>
+          </p:childTnLst>
+        </p:cTn>
+      </p:par>
+    </p:tnLst>
+  </p:timing>
+</p:sld>
+</file>
+
+<file path=ppt/slides/slide4.xml><?xml version="1.0" encoding="utf-8"?>
+<p:sld xmlns:a="http://schemas.openxmlformats.org/drawingml/2006/main" xmlns:r="http://schemas.openxmlformats.org/officeDocument/2006/relationships" xmlns:p="http://schemas.openxmlformats.org/presentationml/2006/main">
+  <p:cSld>
+    <p:spTree>
+      <p:nvGrpSpPr>
+        <p:cNvPr id="1" name=""/>
+        <p:cNvGrpSpPr/>
+        <p:nvPr/>
+      </p:nvGrpSpPr>
+      <p:grpSpPr>
+        <a:xfrm>
+          <a:off x="0" y="0"/>
+          <a:ext cx="0" cy="0"/>
+          <a:chOff x="0" y="0"/>
+          <a:chExt cx="0" cy="0"/>
+        </a:xfrm>
+      </p:grpSpPr>
+      <p:sp>
+        <p:nvSpPr>
+          <p:cNvPr id="175" name="CustomShape 1"/>
+          <p:cNvSpPr/>
+          <p:nvPr/>
+        </p:nvSpPr>
+        <p:spPr>
+          <a:xfrm>
+            <a:off x="422280" y="2271240"/>
+            <a:ext cx="7578360" cy="1944000"/>
+          </a:xfrm>
+          <a:prstGeom prst="rect">
+            <a:avLst/>
+          </a:prstGeom>
+          <a:noFill/>
+          <a:ln>
+            <a:noFill/>
+          </a:ln>
+        </p:spPr>
+        <p:style>
+          <a:lnRef idx="0">
+            <a:scrgbClr r="0" g="0" b="0"/>
+          </a:lnRef>
+          <a:fillRef idx="0">
+            <a:scrgbClr r="0" g="0" b="0"/>
+          </a:fillRef>
+          <a:effectRef idx="0">
+            <a:scrgbClr r="0" g="0" b="0"/>
+          </a:effectRef>
+          <a:fontRef idx="minor"/>
+        </p:style>
+        <p:txBody>
+          <a:bodyPr lIns="68400" tIns="68400" rIns="68400" bIns="68400"/>
+          <a:lstStyle/>
+          <a:p>
+            <a:pPr algn="r">
+              <a:lnSpc>
+                <a:spcPct val="90000"/>
+              </a:lnSpc>
+            </a:pPr>
+            <a:r>
+              <a:rPr lang="en-US" sz="4500" b="1" strike="noStrike" spc="-1">
+                <a:solidFill>
+                  <a:srgbClr val="FFFFFF"/>
+                </a:solidFill>
+                <a:latin typeface="Calibri"/>
+                <a:ea typeface="Calibri"/>
+              </a:rPr>
+              <a:t>General Information</a:t>
+            </a:r>
+            <a:endParaRPr lang="en-US" sz="4500" b="0" strike="noStrike" spc="-1">
+              <a:latin typeface="Arial"/>
+            </a:endParaRPr>
+          </a:p>
+        </p:txBody>
+      </p:sp>
+    </p:spTree>
+  </p:cSld>
+  <p:clrMapOvr>
+    <a:masterClrMapping/>
+  </p:clrMapOvr>
+  <p:timing>
+    <p:tnLst>
+      <p:par>
+        <p:cTn id="1" dur="indefinite" restart="never" nodeType="tmRoot">
+          <p:childTnLst>
+            <p:seq>
+              <p:cTn id="2" dur="indefinite" nodeType="mainSeq"/>
+              <p:prevCondLst>
+                <p:cond evt="onPrev" delay="0">
+                  <p:tgtEl>
+                    <p:sldTgt/>
+                  </p:tgtEl>
+                </p:cond>
+              </p:prevCondLst>
+              <p:nextCondLst>
+                <p:cond evt="onNext" delay="0">
+                  <p:tgtEl>
+                    <p:sldTgt/>
+                  </p:tgtEl>
+                </p:cond>
+              </p:nextCondLst>
+            </p:seq>
+          </p:childTnLst>
+        </p:cTn>
+      </p:par>
+    </p:tnLst>
+  </p:timing>
+</p:sld>
+</file>
+
+<file path=ppt/slides/slide5.xml><?xml version="1.0" encoding="utf-8"?>
+<p:sld xmlns:a="http://schemas.openxmlformats.org/drawingml/2006/main" xmlns:r="http://schemas.openxmlformats.org/officeDocument/2006/relationships" xmlns:p="http://schemas.openxmlformats.org/presentationml/2006/main">
+  <p:cSld>
+    <p:spTree>
+      <p:nvGrpSpPr>
+        <p:cNvPr id="1" name=""/>
+        <p:cNvGrpSpPr/>
+        <p:nvPr/>
+      </p:nvGrpSpPr>
+      <p:grpSpPr>
+        <a:xfrm>
+          <a:off x="0" y="0"/>
+          <a:ext cx="0" cy="0"/>
+          <a:chOff x="0" y="0"/>
+          <a:chExt cx="0" cy="0"/>
+        </a:xfrm>
+      </p:grpSpPr>
+      <p:sp>
+        <p:nvSpPr>
+          <p:cNvPr id="176" name="CustomShape 1"/>
+          <p:cNvSpPr/>
+          <p:nvPr/>
+        </p:nvSpPr>
+        <p:spPr>
+          <a:xfrm>
+            <a:off x="628560" y="273960"/>
+            <a:ext cx="7886160" cy="575280"/>
+          </a:xfrm>
+          <a:prstGeom prst="rect">
+            <a:avLst/>
+          </a:prstGeom>
+          <a:noFill/>
+          <a:ln>
+            <a:noFill/>
+          </a:ln>
+        </p:spPr>
+        <p:style>
+          <a:lnRef idx="0">
+            <a:scrgbClr r="0" g="0" b="0"/>
+          </a:lnRef>
+          <a:fillRef idx="0">
+            <a:scrgbClr r="0" g="0" b="0"/>
+          </a:fillRef>
+          <a:effectRef idx="0">
+            <a:scrgbClr r="0" g="0" b="0"/>
+          </a:effectRef>
+          <a:fontRef idx="minor"/>
+        </p:style>
+        <p:txBody>
+          <a:bodyPr lIns="68400" tIns="68400" rIns="68400" bIns="68400" anchor="ctr"/>
+          <a:lstStyle/>
+          <a:p>
+            <a:pPr>
+              <a:lnSpc>
+                <a:spcPct val="90000"/>
+              </a:lnSpc>
+            </a:pPr>
+            <a:r>
               <a:rPr lang="en-US" sz="3300" b="1" strike="noStrike" spc="-1">
                 <a:solidFill>
                   <a:srgbClr val="000000"/>
@@ -16852,7 +19071,7 @@
 </p:sld>
 </file>
 
-<file path=ppt/slides/slide4.xml><?xml version="1.0" encoding="utf-8"?>
+<file path=ppt/slides/slide6.xml><?xml version="1.0" encoding="utf-8"?>
 <p:sld xmlns:a="http://schemas.openxmlformats.org/drawingml/2006/main" xmlns:r="http://schemas.openxmlformats.org/officeDocument/2006/relationships" xmlns:p="http://schemas.openxmlformats.org/presentationml/2006/main">
   <p:cSld>
     <p:spTree>
@@ -17148,7 +19367,7 @@
 </p:sld>
 </file>
 
-<file path=ppt/slides/slide5.xml><?xml version="1.0" encoding="utf-8"?>
+<file path=ppt/slides/slide7.xml><?xml version="1.0" encoding="utf-8"?>
 <p:sld xmlns:a="http://schemas.openxmlformats.org/drawingml/2006/main" xmlns:r="http://schemas.openxmlformats.org/officeDocument/2006/relationships" xmlns:p="http://schemas.openxmlformats.org/presentationml/2006/main">
   <p:cSld>
     <p:spTree>
@@ -17446,548 +19665,6 @@
                 <a:ea typeface="Calibri"/>
               </a:rPr>
               <a:t>No final report is required.</a:t>
-            </a:r>
-            <a:endParaRPr lang="en-US" sz="2100" b="0" strike="noStrike" spc="-1">
-              <a:latin typeface="Arial"/>
-            </a:endParaRPr>
-          </a:p>
-        </p:txBody>
-      </p:sp>
-    </p:spTree>
-  </p:cSld>
-  <p:clrMapOvr>
-    <a:masterClrMapping/>
-  </p:clrMapOvr>
-  <p:timing>
-    <p:tnLst>
-      <p:par>
-        <p:cTn id="1" dur="indefinite" restart="never" nodeType="tmRoot">
-          <p:childTnLst>
-            <p:seq>
-              <p:cTn id="2" dur="indefinite" nodeType="mainSeq"/>
-              <p:prevCondLst>
-                <p:cond evt="onPrev" delay="0">
-                  <p:tgtEl>
-                    <p:sldTgt/>
-                  </p:tgtEl>
-                </p:cond>
-              </p:prevCondLst>
-              <p:nextCondLst>
-                <p:cond evt="onNext" delay="0">
-                  <p:tgtEl>
-                    <p:sldTgt/>
-                  </p:tgtEl>
-                </p:cond>
-              </p:nextCondLst>
-            </p:seq>
-          </p:childTnLst>
-        </p:cTn>
-      </p:par>
-    </p:tnLst>
-  </p:timing>
-</p:sld>
-</file>
-
-<file path=ppt/slides/slide6.xml><?xml version="1.0" encoding="utf-8"?>
-<p:sld xmlns:a="http://schemas.openxmlformats.org/drawingml/2006/main" xmlns:r="http://schemas.openxmlformats.org/officeDocument/2006/relationships" xmlns:p="http://schemas.openxmlformats.org/presentationml/2006/main">
-  <p:cSld>
-    <p:spTree>
-      <p:nvGrpSpPr>
-        <p:cNvPr id="1" name=""/>
-        <p:cNvGrpSpPr/>
-        <p:nvPr/>
-      </p:nvGrpSpPr>
-      <p:grpSpPr>
-        <a:xfrm>
-          <a:off x="0" y="0"/>
-          <a:ext cx="0" cy="0"/>
-          <a:chOff x="0" y="0"/>
-          <a:chExt cx="0" cy="0"/>
-        </a:xfrm>
-      </p:grpSpPr>
-      <p:sp>
-        <p:nvSpPr>
-          <p:cNvPr id="182" name="CustomShape 1"/>
-          <p:cNvSpPr/>
-          <p:nvPr/>
-        </p:nvSpPr>
-        <p:spPr>
-          <a:xfrm>
-            <a:off x="628560" y="273960"/>
-            <a:ext cx="7886160" cy="575280"/>
-          </a:xfrm>
-          <a:prstGeom prst="rect">
-            <a:avLst/>
-          </a:prstGeom>
-          <a:noFill/>
-          <a:ln>
-            <a:noFill/>
-          </a:ln>
-        </p:spPr>
-        <p:style>
-          <a:lnRef idx="0">
-            <a:scrgbClr r="0" g="0" b="0"/>
-          </a:lnRef>
-          <a:fillRef idx="0">
-            <a:scrgbClr r="0" g="0" b="0"/>
-          </a:fillRef>
-          <a:effectRef idx="0">
-            <a:scrgbClr r="0" g="0" b="0"/>
-          </a:effectRef>
-          <a:fontRef idx="minor"/>
-        </p:style>
-        <p:txBody>
-          <a:bodyPr lIns="68400" tIns="68400" rIns="68400" bIns="68400" anchor="ctr"/>
-          <a:lstStyle/>
-          <a:p>
-            <a:pPr>
-              <a:lnSpc>
-                <a:spcPct val="90000"/>
-              </a:lnSpc>
-            </a:pPr>
-            <a:r>
-              <a:rPr lang="en-US" sz="3300" b="1" strike="noStrike" spc="-1">
-                <a:solidFill>
-                  <a:srgbClr val="000000"/>
-                </a:solidFill>
-                <a:latin typeface="Calibri"/>
-                <a:ea typeface="Calibri"/>
-              </a:rPr>
-              <a:t>No Free-Rider Policy</a:t>
-            </a:r>
-            <a:endParaRPr lang="en-US" sz="3300" b="0" strike="noStrike" spc="-1">
-              <a:latin typeface="Arial"/>
-            </a:endParaRPr>
-          </a:p>
-        </p:txBody>
-      </p:sp>
-      <p:sp>
-        <p:nvSpPr>
-          <p:cNvPr id="183" name="CustomShape 2"/>
-          <p:cNvSpPr/>
-          <p:nvPr/>
-        </p:nvSpPr>
-        <p:spPr>
-          <a:xfrm>
-            <a:off x="628560" y="907560"/>
-            <a:ext cx="7886160" cy="3728520"/>
-          </a:xfrm>
-          <a:prstGeom prst="rect">
-            <a:avLst/>
-          </a:prstGeom>
-          <a:noFill/>
-          <a:ln>
-            <a:noFill/>
-          </a:ln>
-        </p:spPr>
-        <p:style>
-          <a:lnRef idx="0">
-            <a:scrgbClr r="0" g="0" b="0"/>
-          </a:lnRef>
-          <a:fillRef idx="0">
-            <a:scrgbClr r="0" g="0" b="0"/>
-          </a:fillRef>
-          <a:effectRef idx="0">
-            <a:scrgbClr r="0" g="0" b="0"/>
-          </a:effectRef>
-          <a:fontRef idx="minor"/>
-        </p:style>
-        <p:txBody>
-          <a:bodyPr lIns="68400" tIns="68400" rIns="68400" bIns="68400"/>
-          <a:lstStyle/>
-          <a:p>
-            <a:pPr marL="457200" indent="-361080">
-              <a:lnSpc>
-                <a:spcPct val="90000"/>
-              </a:lnSpc>
-              <a:spcBef>
-                <a:spcPts val="799"/>
-              </a:spcBef>
-              <a:buClr>
-                <a:srgbClr val="1F3864"/>
-              </a:buClr>
-              <a:buFont typeface="Arial"/>
-              <a:buChar char="•"/>
-            </a:pPr>
-            <a:r>
-              <a:rPr lang="en-US" sz="2100" b="0" strike="noStrike" spc="-1">
-                <a:solidFill>
-                  <a:srgbClr val="000000"/>
-                </a:solidFill>
-                <a:latin typeface="Calibri"/>
-                <a:ea typeface="Calibri"/>
-              </a:rPr>
-              <a:t>Every group member in each project is expected to do an equal amount of work.</a:t>
-            </a:r>
-            <a:endParaRPr lang="en-US" sz="2100" b="0" strike="noStrike" spc="-1">
-              <a:latin typeface="Arial"/>
-            </a:endParaRPr>
-          </a:p>
-          <a:p>
-            <a:pPr marL="457200" indent="-361080">
-              <a:lnSpc>
-                <a:spcPct val="90000"/>
-              </a:lnSpc>
-              <a:spcBef>
-                <a:spcPts val="799"/>
-              </a:spcBef>
-              <a:buClr>
-                <a:srgbClr val="1F3864"/>
-              </a:buClr>
-              <a:buFont typeface="Arial"/>
-              <a:buChar char="•"/>
-            </a:pPr>
-            <a:r>
-              <a:rPr lang="en-US" sz="2100" b="0" strike="noStrike" spc="-1">
-                <a:solidFill>
-                  <a:srgbClr val="000000"/>
-                </a:solidFill>
-                <a:latin typeface="Calibri"/>
-                <a:ea typeface="Calibri"/>
-              </a:rPr>
-              <a:t>All group members are required to actively participate in the presentations.</a:t>
-            </a:r>
-            <a:endParaRPr lang="en-US" sz="2100" b="0" strike="noStrike" spc="-1">
-              <a:latin typeface="Arial"/>
-            </a:endParaRPr>
-          </a:p>
-          <a:p>
-            <a:pPr marL="457200" indent="-361080">
-              <a:lnSpc>
-                <a:spcPct val="90000"/>
-              </a:lnSpc>
-              <a:spcBef>
-                <a:spcPts val="799"/>
-              </a:spcBef>
-              <a:buClr>
-                <a:srgbClr val="1F3864"/>
-              </a:buClr>
-              <a:buFont typeface="Arial"/>
-              <a:buChar char="•"/>
-            </a:pPr>
-            <a:r>
-              <a:rPr lang="en-US" sz="2100" b="0" strike="noStrike" spc="-1">
-                <a:solidFill>
-                  <a:srgbClr val="000000"/>
-                </a:solidFill>
-                <a:latin typeface="Calibri"/>
-                <a:ea typeface="Calibri"/>
-              </a:rPr>
-              <a:t>If any group member is clearly contributing less than their peers, she or he might get a lower grade than the others.</a:t>
-            </a:r>
-            <a:endParaRPr lang="en-US" sz="2100" b="0" strike="noStrike" spc="-1">
-              <a:latin typeface="Arial"/>
-            </a:endParaRPr>
-          </a:p>
-        </p:txBody>
-      </p:sp>
-    </p:spTree>
-  </p:cSld>
-  <p:clrMapOvr>
-    <a:masterClrMapping/>
-  </p:clrMapOvr>
-  <p:timing>
-    <p:tnLst>
-      <p:par>
-        <p:cTn id="1" dur="indefinite" restart="never" nodeType="tmRoot">
-          <p:childTnLst>
-            <p:seq>
-              <p:cTn id="2" dur="indefinite" nodeType="mainSeq"/>
-              <p:prevCondLst>
-                <p:cond evt="onPrev" delay="0">
-                  <p:tgtEl>
-                    <p:sldTgt/>
-                  </p:tgtEl>
-                </p:cond>
-              </p:prevCondLst>
-              <p:nextCondLst>
-                <p:cond evt="onNext" delay="0">
-                  <p:tgtEl>
-                    <p:sldTgt/>
-                  </p:tgtEl>
-                </p:cond>
-              </p:nextCondLst>
-            </p:seq>
-          </p:childTnLst>
-        </p:cTn>
-      </p:par>
-    </p:tnLst>
-  </p:timing>
-</p:sld>
-</file>
-
-<file path=ppt/slides/slide7.xml><?xml version="1.0" encoding="utf-8"?>
-<p:sld xmlns:a="http://schemas.openxmlformats.org/drawingml/2006/main" xmlns:r="http://schemas.openxmlformats.org/officeDocument/2006/relationships" xmlns:p="http://schemas.openxmlformats.org/presentationml/2006/main">
-  <p:cSld>
-    <p:spTree>
-      <p:nvGrpSpPr>
-        <p:cNvPr id="1" name=""/>
-        <p:cNvGrpSpPr/>
-        <p:nvPr/>
-      </p:nvGrpSpPr>
-      <p:grpSpPr>
-        <a:xfrm>
-          <a:off x="0" y="0"/>
-          <a:ext cx="0" cy="0"/>
-          <a:chOff x="0" y="0"/>
-          <a:chExt cx="0" cy="0"/>
-        </a:xfrm>
-      </p:grpSpPr>
-      <p:sp>
-        <p:nvSpPr>
-          <p:cNvPr id="184" name="CustomShape 1"/>
-          <p:cNvSpPr/>
-          <p:nvPr/>
-        </p:nvSpPr>
-        <p:spPr>
-          <a:xfrm>
-            <a:off x="628560" y="273960"/>
-            <a:ext cx="7886160" cy="575640"/>
-          </a:xfrm>
-          <a:prstGeom prst="rect">
-            <a:avLst/>
-          </a:prstGeom>
-          <a:noFill/>
-          <a:ln>
-            <a:noFill/>
-          </a:ln>
-        </p:spPr>
-        <p:style>
-          <a:lnRef idx="0">
-            <a:scrgbClr r="0" g="0" b="0"/>
-          </a:lnRef>
-          <a:fillRef idx="0">
-            <a:scrgbClr r="0" g="0" b="0"/>
-          </a:fillRef>
-          <a:effectRef idx="0">
-            <a:scrgbClr r="0" g="0" b="0"/>
-          </a:effectRef>
-          <a:fontRef idx="minor"/>
-        </p:style>
-        <p:txBody>
-          <a:bodyPr lIns="68400" tIns="68400" rIns="68400" bIns="68400" anchor="ctr"/>
-          <a:lstStyle/>
-          <a:p>
-            <a:pPr>
-              <a:lnSpc>
-                <a:spcPct val="90000"/>
-              </a:lnSpc>
-            </a:pPr>
-            <a:r>
-              <a:rPr lang="en-US" sz="3300" b="1" strike="noStrike" spc="-1">
-                <a:solidFill>
-                  <a:srgbClr val="000000"/>
-                </a:solidFill>
-                <a:latin typeface="Calibri"/>
-                <a:ea typeface="Calibri"/>
-              </a:rPr>
-              <a:t>Important Notes about Registration</a:t>
-            </a:r>
-            <a:endParaRPr lang="en-US" sz="3300" b="0" strike="noStrike" spc="-1">
-              <a:latin typeface="Arial"/>
-            </a:endParaRPr>
-          </a:p>
-        </p:txBody>
-      </p:sp>
-      <p:sp>
-        <p:nvSpPr>
-          <p:cNvPr id="185" name="CustomShape 2"/>
-          <p:cNvSpPr/>
-          <p:nvPr/>
-        </p:nvSpPr>
-        <p:spPr>
-          <a:xfrm>
-            <a:off x="628560" y="907560"/>
-            <a:ext cx="7886160" cy="3728520"/>
-          </a:xfrm>
-          <a:prstGeom prst="rect">
-            <a:avLst/>
-          </a:prstGeom>
-          <a:noFill/>
-          <a:ln>
-            <a:noFill/>
-          </a:ln>
-        </p:spPr>
-        <p:style>
-          <a:lnRef idx="0">
-            <a:scrgbClr r="0" g="0" b="0"/>
-          </a:lnRef>
-          <a:fillRef idx="0">
-            <a:scrgbClr r="0" g="0" b="0"/>
-          </a:fillRef>
-          <a:effectRef idx="0">
-            <a:scrgbClr r="0" g="0" b="0"/>
-          </a:effectRef>
-          <a:fontRef idx="minor"/>
-        </p:style>
-        <p:txBody>
-          <a:bodyPr lIns="68400" tIns="68400" rIns="68400" bIns="68400"/>
-          <a:lstStyle/>
-          <a:p>
-            <a:pPr marL="457200" indent="-361080">
-              <a:lnSpc>
-                <a:spcPct val="90000"/>
-              </a:lnSpc>
-              <a:spcBef>
-                <a:spcPts val="799"/>
-              </a:spcBef>
-              <a:buClr>
-                <a:srgbClr val="1F3864"/>
-              </a:buClr>
-              <a:buFont typeface="Arial"/>
-              <a:buChar char="•"/>
-            </a:pPr>
-            <a:r>
-              <a:rPr lang="en-US" sz="2100" b="0" strike="noStrike" spc="-1">
-                <a:solidFill>
-                  <a:srgbClr val="000000"/>
-                </a:solidFill>
-                <a:latin typeface="Calibri"/>
-                <a:ea typeface="Calibri"/>
-              </a:rPr>
-              <a:t>We will present projects and you will have the opportunity to declare your interest in the project by putting your name in a spreadsheet. (This will be explained shortly.)</a:t>
-            </a:r>
-            <a:endParaRPr lang="en-US" sz="2100" b="0" strike="noStrike" spc="-1">
-              <a:latin typeface="Arial"/>
-            </a:endParaRPr>
-          </a:p>
-          <a:p>
-            <a:pPr marL="457200" indent="-361080">
-              <a:lnSpc>
-                <a:spcPct val="90000"/>
-              </a:lnSpc>
-              <a:spcBef>
-                <a:spcPts val="799"/>
-              </a:spcBef>
-              <a:buClr>
-                <a:srgbClr val="1F3864"/>
-              </a:buClr>
-              <a:buFont typeface="Arial"/>
-              <a:buChar char="•"/>
-            </a:pPr>
-            <a:r>
-              <a:rPr lang="en-US" sz="2100" b="0" strike="noStrike" spc="-1">
-                <a:solidFill>
-                  <a:srgbClr val="000000"/>
-                </a:solidFill>
-                <a:latin typeface="Calibri"/>
-                <a:ea typeface="Calibri"/>
-              </a:rPr>
-              <a:t>The projects will be assigned to students until latest November 6, 2020.</a:t>
-            </a:r>
-            <a:endParaRPr lang="en-US" sz="2100" b="0" strike="noStrike" spc="-1">
-              <a:latin typeface="Arial"/>
-            </a:endParaRPr>
-          </a:p>
-          <a:p>
-            <a:pPr marL="457200" indent="-361080">
-              <a:lnSpc>
-                <a:spcPct val="90000"/>
-              </a:lnSpc>
-              <a:spcBef>
-                <a:spcPts val="799"/>
-              </a:spcBef>
-              <a:buClr>
-                <a:srgbClr val="1F3864"/>
-              </a:buClr>
-              <a:buFont typeface="Arial"/>
-              <a:buChar char="•"/>
-            </a:pPr>
-            <a:r>
-              <a:rPr lang="en-US" sz="2100" b="0" strike="noStrike" spc="-1">
-                <a:solidFill>
-                  <a:srgbClr val="000000"/>
-                </a:solidFill>
-                <a:latin typeface="Calibri"/>
-                <a:ea typeface="Calibri"/>
-              </a:rPr>
-              <a:t>You will be informed if you got selected for the project and will be asked to confirm that you are still available for the project.</a:t>
-            </a:r>
-            <a:endParaRPr lang="en-US" sz="2100" b="0" strike="noStrike" spc="-1">
-              <a:latin typeface="Arial"/>
-            </a:endParaRPr>
-          </a:p>
-          <a:p>
-            <a:pPr marL="457200" indent="-361080">
-              <a:lnSpc>
-                <a:spcPct val="90000"/>
-              </a:lnSpc>
-              <a:spcBef>
-                <a:spcPts val="799"/>
-              </a:spcBef>
-              <a:buClr>
-                <a:srgbClr val="1F3864"/>
-              </a:buClr>
-              <a:buFont typeface="Arial"/>
-              <a:buChar char="•"/>
-            </a:pPr>
-            <a:r>
-              <a:rPr lang="en-US" sz="2100" b="1" strike="noStrike" spc="-1">
-                <a:solidFill>
-                  <a:srgbClr val="000000"/>
-                </a:solidFill>
-                <a:latin typeface="Calibri"/>
-                <a:ea typeface="Calibri"/>
-              </a:rPr>
-              <a:t>After</a:t>
-            </a:r>
-            <a:r>
-              <a:rPr lang="en-US" sz="2100" b="0" strike="noStrike" spc="-1">
-                <a:solidFill>
-                  <a:srgbClr val="000000"/>
-                </a:solidFill>
-                <a:latin typeface="Calibri"/>
-                <a:ea typeface="Calibri"/>
-              </a:rPr>
-              <a:t> you have been assigned to a project, you need to register yourself in BASIS for the project.</a:t>
-            </a:r>
-            <a:endParaRPr lang="en-US" sz="2100" b="0" strike="noStrike" spc="-1">
-              <a:latin typeface="Arial"/>
-            </a:endParaRPr>
-          </a:p>
-          <a:p>
-            <a:pPr marL="457200" indent="-361080">
-              <a:lnSpc>
-                <a:spcPct val="90000"/>
-              </a:lnSpc>
-              <a:spcBef>
-                <a:spcPts val="799"/>
-              </a:spcBef>
-              <a:buClr>
-                <a:srgbClr val="1F3864"/>
-              </a:buClr>
-              <a:buFont typeface="Arial"/>
-              <a:buChar char="•"/>
-            </a:pPr>
-            <a:r>
-              <a:rPr lang="en-US" sz="2100" b="0" strike="noStrike" spc="-1">
-                <a:solidFill>
-                  <a:srgbClr val="000000"/>
-                </a:solidFill>
-                <a:latin typeface="Calibri"/>
-                <a:ea typeface="Calibri"/>
-              </a:rPr>
-              <a:t>The registration in BASIS must be completed until </a:t>
-            </a:r>
-            <a:r>
-              <a:rPr lang="en-US" sz="2100" b="1" strike="noStrike" spc="-1">
-                <a:solidFill>
-                  <a:srgbClr val="ED7D31"/>
-                </a:solidFill>
-                <a:latin typeface="Calibri"/>
-                <a:ea typeface="Calibri"/>
-              </a:rPr>
-              <a:t>November 15</a:t>
-            </a:r>
-            <a:r>
-              <a:rPr lang="en-US" sz="2100" b="0" strike="noStrike" spc="-1">
-                <a:solidFill>
-                  <a:srgbClr val="000000"/>
-                </a:solidFill>
-                <a:latin typeface="Calibri"/>
-                <a:ea typeface="Calibri"/>
-              </a:rPr>
-              <a:t>.</a:t>
             </a:r>
             <a:endParaRPr lang="en-US" sz="2100" b="0" strike="noStrike" spc="-1">
               <a:latin typeface="Arial"/>
@@ -18049,7 +19726,7 @@
       </p:grpSpPr>
       <p:sp>
         <p:nvSpPr>
-          <p:cNvPr id="186" name="CustomShape 1"/>
+          <p:cNvPr id="182" name="CustomShape 1"/>
           <p:cNvSpPr/>
           <p:nvPr/>
         </p:nvSpPr>
@@ -18095,7 +19772,7 @@
                 <a:latin typeface="Calibri"/>
                 <a:ea typeface="Calibri"/>
               </a:rPr>
-              <a:t>Project assignments</a:t>
+              <a:t>No Free-Rider Policy</a:t>
             </a:r>
             <a:endParaRPr lang="en-US" sz="3300" b="0" strike="noStrike" spc="-1">
               <a:latin typeface="Arial"/>
@@ -18105,7 +19782,7 @@
       </p:sp>
       <p:sp>
         <p:nvSpPr>
-          <p:cNvPr id="187" name="CustomShape 2"/>
+          <p:cNvPr id="183" name="CustomShape 2"/>
           <p:cNvSpPr/>
           <p:nvPr/>
         </p:nvSpPr>
@@ -18159,7 +19836,7 @@
                 <a:latin typeface="Calibri"/>
                 <a:ea typeface="Calibri"/>
               </a:rPr>
-              <a:t>We will now start with the topic presentations.</a:t>
+              <a:t>Every group member in each project is expected to do an equal amount of work.</a:t>
             </a:r>
             <a:endParaRPr lang="en-US" sz="2100" b="0" strike="noStrike" spc="-1">
               <a:latin typeface="Arial"/>
@@ -18187,47 +19864,7 @@
                 <a:latin typeface="Calibri"/>
                 <a:ea typeface="Calibri"/>
               </a:rPr>
-              <a:t>If you are interested in a project, you can put your </a:t>
-            </a:r>
-            <a:r>
-              <a:rPr lang="en-US" sz="2100" b="1" strike="noStrike" spc="-1">
-                <a:solidFill>
-                  <a:srgbClr val="000000"/>
-                </a:solidFill>
-                <a:latin typeface="Calibri"/>
-                <a:ea typeface="Calibri"/>
-              </a:rPr>
-              <a:t>full name</a:t>
-            </a:r>
-            <a:r>
-              <a:rPr lang="en-US" sz="2100" b="0" strike="noStrike" spc="-1">
-                <a:solidFill>
-                  <a:srgbClr val="000000"/>
-                </a:solidFill>
-                <a:latin typeface="Calibri"/>
-                <a:ea typeface="Calibri"/>
-              </a:rPr>
-              <a:t> and </a:t>
-            </a:r>
-            <a:r>
-              <a:rPr lang="en-US" sz="2100" b="1" strike="noStrike" spc="-1">
-                <a:solidFill>
-                  <a:srgbClr val="000000"/>
-                </a:solidFill>
-                <a:latin typeface="Calibri"/>
-                <a:ea typeface="Calibri"/>
-              </a:rPr>
-              <a:t>email address</a:t>
-            </a:r>
-            <a:r>
-              <a:rPr lang="en-US" sz="2100" b="0" strike="noStrike" spc="-1">
-                <a:solidFill>
-                  <a:srgbClr val="000000"/>
-                </a:solidFill>
-                <a:latin typeface="Calibri"/>
-                <a:ea typeface="Calibri"/>
-              </a:rPr>
-              <a:t> into the spreadsheet linked in the next slide.</a:t>
+              <a:t>All group members are required to actively participate in the presentations.</a:t>
             </a:r>
             <a:endParaRPr lang="en-US" sz="2100" b="0" strike="noStrike" spc="-1">
               <a:latin typeface="Arial"/>
@@ -18255,125 +19892,8 @@
                 <a:latin typeface="Calibri"/>
                 <a:ea typeface="Calibri"/>
               </a:rPr>
-              <a:t>You can register for multiple projects.</a:t>
+              <a:t>If any group member is clearly contributing less than their peers, she or he might get a lower grade than the others.</a:t>
             </a:r>
-            <a:endParaRPr lang="en-US" sz="2100" b="0" strike="noStrike" spc="-1">
-              <a:latin typeface="Arial"/>
-            </a:endParaRPr>
-          </a:p>
-          <a:p>
-            <a:pPr marL="457200" indent="-361080">
-              <a:lnSpc>
-                <a:spcPct val="90000"/>
-              </a:lnSpc>
-              <a:spcBef>
-                <a:spcPts val="799"/>
-              </a:spcBef>
-              <a:buClr>
-                <a:srgbClr val="1F3864"/>
-              </a:buClr>
-              <a:buFont typeface="Arial"/>
-              <a:buChar char="•"/>
-            </a:pPr>
-            <a:r>
-              <a:rPr lang="en-US" sz="2100" b="0" strike="noStrike" spc="-1">
-                <a:solidFill>
-                  <a:srgbClr val="000000"/>
-                </a:solidFill>
-                <a:latin typeface="Calibri"/>
-                <a:ea typeface="Calibri"/>
-              </a:rPr>
-              <a:t>You can put your name with up to 3 other people together in one row, if you already know with whom you want to work together.</a:t>
-            </a:r>
-            <a:endParaRPr lang="en-US" sz="2100" b="0" strike="noStrike" spc="-1">
-              <a:latin typeface="Arial"/>
-            </a:endParaRPr>
-          </a:p>
-          <a:p>
-            <a:pPr marL="457200" indent="-361080">
-              <a:lnSpc>
-                <a:spcPct val="90000"/>
-              </a:lnSpc>
-              <a:spcBef>
-                <a:spcPts val="799"/>
-              </a:spcBef>
-              <a:buClr>
-                <a:srgbClr val="1F3864"/>
-              </a:buClr>
-              <a:buFont typeface="Arial"/>
-              <a:buChar char="•"/>
-            </a:pPr>
-            <a:r>
-              <a:rPr lang="en-US" sz="2100" b="0" strike="noStrike" spc="-1">
-                <a:solidFill>
-                  <a:srgbClr val="000000"/>
-                </a:solidFill>
-                <a:latin typeface="Calibri"/>
-                <a:ea typeface="Calibri"/>
-              </a:rPr>
-              <a:t>The project leaders will contact you within the next 7 days.</a:t>
-            </a:r>
-            <a:endParaRPr lang="en-US" sz="2100" b="0" strike="noStrike" spc="-1">
-              <a:latin typeface="Arial"/>
-            </a:endParaRPr>
-          </a:p>
-          <a:p>
-            <a:pPr marL="457200" indent="-361080">
-              <a:lnSpc>
-                <a:spcPct val="90000"/>
-              </a:lnSpc>
-              <a:spcBef>
-                <a:spcPts val="799"/>
-              </a:spcBef>
-              <a:buClr>
-                <a:srgbClr val="1F3864"/>
-              </a:buClr>
-              <a:buFont typeface="Arial"/>
-              <a:buChar char="•"/>
-            </a:pPr>
-            <a:r>
-              <a:rPr lang="en-US" sz="2100" b="0" strike="noStrike" spc="-1">
-                <a:solidFill>
-                  <a:srgbClr val="000000"/>
-                </a:solidFill>
-                <a:latin typeface="Calibri"/>
-                <a:ea typeface="Calibri"/>
-              </a:rPr>
-              <a:t>If you get chosen for a project and confirmed your participation, please </a:t>
-            </a:r>
-            <a:r>
-              <a:rPr lang="en-US" sz="2100" b="1" strike="noStrike" spc="-1">
-                <a:solidFill>
-                  <a:srgbClr val="000000"/>
-                </a:solidFill>
-                <a:latin typeface="Calibri"/>
-                <a:ea typeface="Calibri"/>
-              </a:rPr>
-              <a:t>cross out</a:t>
-            </a:r>
-            <a:r>
-              <a:rPr lang="en-US" sz="2100" b="0" strike="noStrike" spc="-1">
-                <a:solidFill>
-                  <a:srgbClr val="000000"/>
-                </a:solidFill>
-                <a:latin typeface="Calibri"/>
-                <a:ea typeface="Calibri"/>
-              </a:rPr>
-              <a:t> your name in the spreadsheet.</a:t>
-            </a:r>
-            <a:endParaRPr lang="en-US" sz="2100" b="0" strike="noStrike" spc="-1">
-              <a:latin typeface="Arial"/>
-            </a:endParaRPr>
-          </a:p>
-          <a:p>
-            <a:pPr>
-              <a:lnSpc>
-                <a:spcPct val="90000"/>
-              </a:lnSpc>
-              <a:spcBef>
-                <a:spcPts val="799"/>
-              </a:spcBef>
-            </a:pPr>
             <a:endParaRPr lang="en-US" sz="2100" b="0" strike="noStrike" spc="-1">
               <a:latin typeface="Arial"/>
             </a:endParaRPr>
@@ -18434,7 +19954,7 @@
       </p:grpSpPr>
       <p:sp>
         <p:nvSpPr>
-          <p:cNvPr id="188" name="CustomShape 1"/>
+          <p:cNvPr id="184" name="CustomShape 1"/>
           <p:cNvSpPr/>
           <p:nvPr/>
         </p:nvSpPr>
@@ -18480,7 +20000,7 @@
                 <a:latin typeface="Calibri"/>
                 <a:ea typeface="Calibri"/>
               </a:rPr>
-              <a:t>Spreadsheet for Project Assignment</a:t>
+              <a:t>Important Notes about Registration</a:t>
             </a:r>
             <a:endParaRPr lang="en-US" sz="3300" b="0" strike="noStrike" spc="-1">
               <a:latin typeface="Arial"/>
@@ -18490,7 +20010,7 @@
       </p:sp>
       <p:sp>
         <p:nvSpPr>
-          <p:cNvPr id="189" name="CustomShape 2"/>
+          <p:cNvPr id="185" name="CustomShape 2"/>
           <p:cNvSpPr/>
           <p:nvPr/>
         </p:nvSpPr>
@@ -18544,7 +20064,7 @@
                 <a:latin typeface="Calibri"/>
                 <a:ea typeface="Calibri"/>
               </a:rPr>
-              <a:t>Please use the following spreadsheet to declare your interest in a project.</a:t>
+              <a:t>We will present projects and you will have the opportunity to declare your interest in the project by putting your name in a spreadsheet. (This will be explained shortly.)</a:t>
             </a:r>
             <a:endParaRPr lang="en-US" sz="2100" b="0" strike="noStrike" spc="-1">
               <a:latin typeface="Arial"/>
@@ -18572,7 +20092,7 @@
                 <a:latin typeface="Calibri"/>
                 <a:ea typeface="Calibri"/>
               </a:rPr>
-              <a:t>Please check now that you are able to access the spreadsheet.</a:t>
+              <a:t>The projects will be assigned to students until latest November 6, 2020.</a:t>
             </a:r>
             <a:endParaRPr lang="en-US" sz="2100" b="0" strike="noStrike" spc="-1">
               <a:latin typeface="Arial"/>
@@ -18600,7 +20120,45 @@
                 <a:latin typeface="Calibri"/>
                 <a:ea typeface="Calibri"/>
               </a:rPr>
-              <a:t>The spreadsheet will be available until November 1, 11:59pm.</a:t>
+              <a:t>You will be informed if you got selected for the project and will be asked to confirm that you are still available for the project.</a:t>
+            </a:r>
+            <a:endParaRPr lang="en-US" sz="2100" b="0" strike="noStrike" spc="-1">
+              <a:latin typeface="Arial"/>
+            </a:endParaRPr>
+          </a:p>
+          <a:p>
+            <a:pPr marL="457200" indent="-361080">
+              <a:lnSpc>
+                <a:spcPct val="90000"/>
+              </a:lnSpc>
+              <a:spcBef>
+                <a:spcPts val="799"/>
+              </a:spcBef>
+              <a:buClr>
+                <a:srgbClr val="1F3864"/>
+              </a:buClr>
+              <a:buFont typeface="Arial"/>
+              <a:buChar char="•"/>
+            </a:pPr>
+            <a:r>
+              <a:rPr lang="en-US" sz="2100" b="1" strike="noStrike" spc="-1">
+                <a:solidFill>
+                  <a:srgbClr val="000000"/>
+                </a:solidFill>
+                <a:latin typeface="Calibri"/>
+                <a:ea typeface="Calibri"/>
+              </a:rPr>
+              <a:t>After</a:t>
+            </a:r>
+            <a:r>
+              <a:rPr lang="en-US" sz="2100" b="0" strike="noStrike" spc="-1">
+                <a:solidFill>
+                  <a:srgbClr val="000000"/>
+                </a:solidFill>
+                <a:latin typeface="Calibri"/>
+                <a:ea typeface="Calibri"/>
+              </a:rPr>
+              <a:t> you have been assigned to a project, you need to register yourself in BASIS for the project.</a:t>
             </a:r>
             <a:endParaRPr lang="en-US" sz="2100" b="0" strike="noStrike" spc="-1">
               <a:latin typeface="Arial"/>
@@ -18628,123 +20186,29 @@
                 <a:latin typeface="Calibri"/>
                 <a:ea typeface="Calibri"/>
               </a:rPr>
-              <a:t>You won’t be able to enter your name after the deadline.</a:t>
+              <a:t>The registration in BASIS must be completed until </a:t>
             </a:r>
-            <a:endParaRPr lang="en-US" sz="2100" b="0" strike="noStrike" spc="-1">
-              <a:latin typeface="Arial"/>
-            </a:endParaRPr>
-          </a:p>
-        </p:txBody>
-      </p:sp>
-      <p:sp>
-        <p:nvSpPr>
-          <p:cNvPr id="190" name="CustomShape 3"/>
-          <p:cNvSpPr/>
-          <p:nvPr/>
-        </p:nvSpPr>
-        <p:spPr>
-          <a:xfrm>
-            <a:off x="963360" y="3630240"/>
-            <a:ext cx="7174440" cy="1004760"/>
-          </a:xfrm>
-          <a:prstGeom prst="rect">
-            <a:avLst/>
-          </a:prstGeom>
-          <a:noFill/>
-          <a:ln w="38160">
-            <a:solidFill>
-              <a:schemeClr val="accent2"/>
-            </a:solidFill>
-            <a:round/>
-          </a:ln>
-        </p:spPr>
-        <p:style>
-          <a:lnRef idx="0">
-            <a:scrgbClr r="0" g="0" b="0"/>
-          </a:lnRef>
-          <a:fillRef idx="0">
-            <a:scrgbClr r="0" g="0" b="0"/>
-          </a:fillRef>
-          <a:effectRef idx="0">
-            <a:scrgbClr r="0" g="0" b="0"/>
-          </a:effectRef>
-          <a:fontRef idx="minor"/>
-        </p:style>
-        <p:txBody>
-          <a:bodyPr wrap="none" lIns="90000" tIns="45000" rIns="90000" bIns="45000"/>
-          <a:lstStyle/>
-          <a:p>
-            <a:pPr>
-              <a:lnSpc>
-                <a:spcPct val="100000"/>
-              </a:lnSpc>
-            </a:pPr>
             <a:r>
-              <a:rPr lang="en-US" sz="2000" b="0" strike="noStrike" spc="-1" dirty="0">
+              <a:rPr lang="en-US" sz="2100" b="1" strike="noStrike" spc="-1">
+                <a:solidFill>
+                  <a:srgbClr val="ED7D31"/>
+                </a:solidFill>
+                <a:latin typeface="Calibri"/>
+                <a:ea typeface="Calibri"/>
+              </a:rPr>
+              <a:t>November 15</a:t>
+            </a:r>
+            <a:r>
+              <a:rPr lang="en-US" sz="2100" b="0" strike="noStrike" spc="-1">
                 <a:solidFill>
                   <a:srgbClr val="000000"/>
                 </a:solidFill>
-                <a:latin typeface="Arial"/>
-                <a:ea typeface="Arial"/>
+                <a:latin typeface="Calibri"/>
+                <a:ea typeface="Calibri"/>
               </a:rPr>
-              <a:t>Link: </a:t>
+              <a:t>.</a:t>
             </a:r>
-            <a:r>
-              <a:rPr lang="en-US" sz="2000" b="0" u="sng" strike="noStrike" spc="-1" dirty="0">
-                <a:solidFill>
-                  <a:srgbClr val="0563C1"/>
-                </a:solidFill>
-                <a:uFillTx/>
-                <a:latin typeface="Arial"/>
-                <a:ea typeface="Arial"/>
-                <a:hlinkClick r:id="rId2"/>
-              </a:rPr>
-              <a:t>https://uni-bonn.sciebo.de/s/IwA1dRbIxhqWezK</a:t>
-            </a:r>
-            <a:endParaRPr lang="en-US" sz="2000" b="0" strike="noStrike" spc="-1" dirty="0">
-              <a:latin typeface="Arial"/>
-            </a:endParaRPr>
-          </a:p>
-          <a:p>
-            <a:pPr>
-              <a:lnSpc>
-                <a:spcPct val="100000"/>
-              </a:lnSpc>
-            </a:pPr>
-            <a:endParaRPr lang="en-US" sz="2000" b="0" strike="noStrike" spc="-1" dirty="0">
-              <a:latin typeface="Arial"/>
-            </a:endParaRPr>
-          </a:p>
-          <a:p>
-            <a:pPr>
-              <a:lnSpc>
-                <a:spcPct val="100000"/>
-              </a:lnSpc>
-            </a:pPr>
-            <a:r>
-              <a:rPr lang="en-US" sz="2000" b="0" strike="noStrike" spc="-1" dirty="0">
-                <a:solidFill>
-                  <a:srgbClr val="000000"/>
-                </a:solidFill>
-                <a:latin typeface="Arial"/>
-                <a:ea typeface="Arial"/>
-              </a:rPr>
-              <a:t>Password: </a:t>
-            </a:r>
-            <a:r>
-              <a:rPr lang="en-US" sz="2000" b="0" strike="noStrike" spc="-1" dirty="0">
-                <a:solidFill>
-                  <a:schemeClr val="accent2"/>
-                </a:solidFill>
-                <a:latin typeface="Arial"/>
-                <a:ea typeface="Arial"/>
-              </a:rPr>
-              <a:t>&lt;The password will be provided in the lecture&gt;</a:t>
-            </a:r>
-            <a:endParaRPr lang="en-US" sz="2000" b="0" strike="noStrike" spc="-1" dirty="0">
-              <a:solidFill>
-                <a:schemeClr val="accent2"/>
-              </a:solidFill>
+            <a:endParaRPr lang="en-US" sz="2100" b="0" strike="noStrike" spc="-1">
               <a:latin typeface="Arial"/>
             </a:endParaRPr>
           </a:p>

</xml_diff>